<commit_message>
presentation ppt - wip
</commit_message>
<xml_diff>
--- a/docs/Presentation-20231220.pptx
+++ b/docs/Presentation-20231220.pptx
@@ -5,13 +5,20 @@
     <p:sldMasterId id="2147483660" r:id="rId1"/>
   </p:sldMasterIdLst>
   <p:notesMasterIdLst>
-    <p:notesMasterId r:id="rId6"/>
+    <p:notesMasterId r:id="rId13"/>
   </p:notesMasterIdLst>
   <p:sldIdLst>
     <p:sldId id="258" r:id="rId2"/>
     <p:sldId id="2076138220" r:id="rId3"/>
     <p:sldId id="2076138265" r:id="rId4"/>
-    <p:sldId id="2076138264" r:id="rId5"/>
+    <p:sldId id="2076138272" r:id="rId5"/>
+    <p:sldId id="2076138266" r:id="rId6"/>
+    <p:sldId id="2076138267" r:id="rId7"/>
+    <p:sldId id="2076138268" r:id="rId8"/>
+    <p:sldId id="2076138269" r:id="rId9"/>
+    <p:sldId id="2076138270" r:id="rId10"/>
+    <p:sldId id="2076138271" r:id="rId11"/>
+    <p:sldId id="2076138264" r:id="rId12"/>
   </p:sldIdLst>
   <p:sldSz cx="12192000" cy="6858000"/>
   <p:notesSz cx="6858000" cy="9144000"/>
@@ -55531,6 +55538,587 @@
 </p:sld>
 </file>
 
+<file path=ppt/slides/slide10.xml><?xml version="1.0" encoding="utf-8"?>
+<p:sld xmlns:a="http://schemas.openxmlformats.org/drawingml/2006/main" xmlns:r="http://schemas.openxmlformats.org/officeDocument/2006/relationships" xmlns:p="http://schemas.openxmlformats.org/presentationml/2006/main">
+  <p:cSld>
+    <p:spTree>
+      <p:nvGrpSpPr>
+        <p:cNvPr id="1" name=""/>
+        <p:cNvGrpSpPr/>
+        <p:nvPr/>
+      </p:nvGrpSpPr>
+      <p:grpSpPr>
+        <a:xfrm>
+          <a:off x="0" y="0"/>
+          <a:ext cx="0" cy="0"/>
+          <a:chOff x="0" y="0"/>
+          <a:chExt cx="0" cy="0"/>
+        </a:xfrm>
+      </p:grpSpPr>
+      <p:sp>
+        <p:nvSpPr>
+          <p:cNvPr id="2" name="Title 1">
+            <a:extLst>
+              <a:ext uri="{FF2B5EF4-FFF2-40B4-BE49-F238E27FC236}">
+                <a16:creationId xmlns:a16="http://schemas.microsoft.com/office/drawing/2014/main" id="{E5BBB390-B73E-4812-940C-A2213C93E2DC}"/>
+              </a:ext>
+            </a:extLst>
+          </p:cNvPr>
+          <p:cNvSpPr>
+            <a:spLocks noGrp="1"/>
+          </p:cNvSpPr>
+          <p:nvPr>
+            <p:ph type="title"/>
+          </p:nvPr>
+        </p:nvSpPr>
+        <p:spPr>
+          <a:xfrm>
+            <a:off x="455995" y="620428"/>
+            <a:ext cx="11306469" cy="397545"/>
+          </a:xfrm>
+        </p:spPr>
+        <p:txBody>
+          <a:bodyPr/>
+          <a:lstStyle/>
+          <a:p>
+            <a:r>
+              <a:rPr lang="en-US" dirty="0">
+                <a:solidFill>
+                  <a:schemeClr val="accent2">
+                    <a:lumMod val="60000"/>
+                    <a:lumOff val="40000"/>
+                  </a:schemeClr>
+                </a:solidFill>
+                <a:cs typeface="Segoe UI Semibold"/>
+              </a:rPr>
+              <a:t>Wrap Up and Links</a:t>
+            </a:r>
+            <a:endParaRPr lang="en-US" dirty="0">
+              <a:solidFill>
+                <a:schemeClr val="accent2">
+                  <a:lumMod val="60000"/>
+                  <a:lumOff val="40000"/>
+                </a:schemeClr>
+              </a:solidFill>
+            </a:endParaRPr>
+          </a:p>
+        </p:txBody>
+      </p:sp>
+      <p:sp>
+        <p:nvSpPr>
+          <p:cNvPr id="3" name="Text Placeholder 2">
+            <a:extLst>
+              <a:ext uri="{FF2B5EF4-FFF2-40B4-BE49-F238E27FC236}">
+                <a16:creationId xmlns:a16="http://schemas.microsoft.com/office/drawing/2014/main" id="{AC3E1E3F-8E9B-4AA3-AFD9-4D7278053F9A}"/>
+              </a:ext>
+            </a:extLst>
+          </p:cNvPr>
+          <p:cNvSpPr>
+            <a:spLocks noGrp="1"/>
+          </p:cNvSpPr>
+          <p:nvPr>
+            <p:ph type="body" sz="quarter" idx="10"/>
+          </p:nvPr>
+        </p:nvSpPr>
+        <p:spPr>
+          <a:xfrm>
+            <a:off x="455995" y="1922586"/>
+            <a:ext cx="9384447" cy="1200329"/>
+          </a:xfrm>
+        </p:spPr>
+        <p:txBody>
+          <a:bodyPr vert="horz" wrap="square" lIns="0" tIns="0" rIns="0" bIns="0" rtlCol="0" anchor="t">
+            <a:spAutoFit/>
+          </a:bodyPr>
+          <a:lstStyle/>
+          <a:p>
+            <a:pPr marL="280035" indent="-280035">
+              <a:lnSpc>
+                <a:spcPct val="150000"/>
+              </a:lnSpc>
+              <a:spcAft>
+                <a:spcPts val="588"/>
+              </a:spcAft>
+              <a:buFont typeface="Arial,Sans-Serif" panose="020B0604020202020204" pitchFamily="34" charset="0"/>
+            </a:pPr>
+            <a:endParaRPr lang="en-US">
+              <a:ea typeface="+mn-lt"/>
+              <a:cs typeface="+mn-lt"/>
+            </a:endParaRPr>
+          </a:p>
+          <a:p>
+            <a:pPr marL="280035" indent="-280035">
+              <a:lnSpc>
+                <a:spcPct val="90000"/>
+              </a:lnSpc>
+              <a:spcAft>
+                <a:spcPts val="588"/>
+              </a:spcAft>
+              <a:buFont typeface="Arial,Sans-Serif" panose="020B0604020202020204" pitchFamily="34" charset="0"/>
+              <a:buChar char="•"/>
+            </a:pPr>
+            <a:endParaRPr lang="en-US">
+              <a:ea typeface="+mn-lt"/>
+              <a:cs typeface="+mn-lt"/>
+            </a:endParaRPr>
+          </a:p>
+          <a:p>
+            <a:pPr marL="335915" indent="-335915"/>
+            <a:endParaRPr lang="en-US">
+              <a:ea typeface="+mn-lt"/>
+              <a:cs typeface="+mn-lt"/>
+            </a:endParaRPr>
+          </a:p>
+        </p:txBody>
+      </p:sp>
+      <p:sp>
+        <p:nvSpPr>
+          <p:cNvPr id="4" name="TextBox 3">
+            <a:extLst>
+              <a:ext uri="{FF2B5EF4-FFF2-40B4-BE49-F238E27FC236}">
+                <a16:creationId xmlns:a16="http://schemas.microsoft.com/office/drawing/2014/main" id="{40C999F7-4F4C-403D-A55C-E359CFC56B8B}"/>
+              </a:ext>
+            </a:extLst>
+          </p:cNvPr>
+          <p:cNvSpPr txBox="1"/>
+          <p:nvPr/>
+        </p:nvSpPr>
+        <p:spPr>
+          <a:xfrm>
+            <a:off x="1055411" y="1469630"/>
+            <a:ext cx="10081178" cy="1526572"/>
+          </a:xfrm>
+          <a:prstGeom prst="rect">
+            <a:avLst/>
+          </a:prstGeom>
+          <a:noFill/>
+        </p:spPr>
+        <p:txBody>
+          <a:bodyPr rot="0" spcFirstLastPara="0" vertOverflow="overflow" horzOverflow="overflow" vert="horz" wrap="square" lIns="182880" tIns="146304" rIns="182880" bIns="146304" numCol="1" spcCol="0" rtlCol="0" fromWordArt="0" anchor="t" anchorCtr="0" forceAA="0" compatLnSpc="1">
+            <a:prstTxWarp prst="textNoShape">
+              <a:avLst/>
+            </a:prstTxWarp>
+            <a:spAutoFit/>
+          </a:bodyPr>
+          <a:lstStyle/>
+          <a:p>
+            <a:pPr marL="457200" indent="-457200">
+              <a:buFont typeface="Arial" panose="020B0604020202020204" pitchFamily="34" charset="0"/>
+              <a:buChar char="•"/>
+            </a:pPr>
+            <a:r>
+              <a:rPr lang="en-US" sz="2800" b="0" dirty="0">
+                <a:solidFill>
+                  <a:srgbClr val="000000"/>
+                </a:solidFill>
+                <a:effectLst/>
+              </a:rPr>
+              <a:t>X</a:t>
+            </a:r>
+          </a:p>
+          <a:p>
+            <a:pPr marL="457200" indent="-457200">
+              <a:buFont typeface="Arial" panose="020B0604020202020204" pitchFamily="34" charset="0"/>
+              <a:buChar char="•"/>
+            </a:pPr>
+            <a:endParaRPr lang="en-US" sz="2800" b="0" dirty="0">
+              <a:solidFill>
+                <a:srgbClr val="000000"/>
+              </a:solidFill>
+              <a:effectLst/>
+            </a:endParaRPr>
+          </a:p>
+          <a:p>
+            <a:endParaRPr lang="en-US" sz="2400" dirty="0">
+              <a:cs typeface="Segoe UI"/>
+            </a:endParaRPr>
+          </a:p>
+        </p:txBody>
+      </p:sp>
+      <p:sp>
+        <p:nvSpPr>
+          <p:cNvPr id="9" name="Rectangle 8">
+            <a:extLst>
+              <a:ext uri="{FF2B5EF4-FFF2-40B4-BE49-F238E27FC236}">
+                <a16:creationId xmlns:a16="http://schemas.microsoft.com/office/drawing/2014/main" id="{E3743541-CC54-4122-901F-31E4C928C0B5}"/>
+              </a:ext>
+            </a:extLst>
+          </p:cNvPr>
+          <p:cNvSpPr/>
+          <p:nvPr/>
+        </p:nvSpPr>
+        <p:spPr bwMode="auto">
+          <a:xfrm>
+            <a:off x="5667829" y="968829"/>
+            <a:ext cx="914400" cy="152400"/>
+          </a:xfrm>
+          <a:prstGeom prst="rect">
+            <a:avLst/>
+          </a:prstGeom>
+          <a:solidFill>
+            <a:schemeClr val="bg1"/>
+          </a:solidFill>
+          <a:ln>
+            <a:noFill/>
+            <a:headEnd type="none" w="med" len="med"/>
+            <a:tailEnd type="none" w="med" len="med"/>
+          </a:ln>
+          <a:effectLst/>
+        </p:spPr>
+        <p:style>
+          <a:lnRef idx="1">
+            <a:schemeClr val="accent2"/>
+          </a:lnRef>
+          <a:fillRef idx="3">
+            <a:schemeClr val="accent2"/>
+          </a:fillRef>
+          <a:effectRef idx="2">
+            <a:schemeClr val="accent2"/>
+          </a:effectRef>
+          <a:fontRef idx="minor">
+            <a:schemeClr val="lt1"/>
+          </a:fontRef>
+        </p:style>
+        <p:txBody>
+          <a:bodyPr rot="0" spcFirstLastPara="0" vertOverflow="overflow" horzOverflow="overflow" vert="horz" wrap="square" lIns="182880" tIns="146304" rIns="182880" bIns="146304" numCol="1" spcCol="0" rtlCol="0" fromWordArt="0" anchor="t" anchorCtr="0" forceAA="0" compatLnSpc="1">
+            <a:prstTxWarp prst="textNoShape">
+              <a:avLst/>
+            </a:prstTxWarp>
+            <a:noAutofit/>
+          </a:bodyPr>
+          <a:lstStyle/>
+          <a:p>
+            <a:pPr algn="ctr" defTabSz="932472" fontAlgn="base">
+              <a:lnSpc>
+                <a:spcPct val="90000"/>
+              </a:lnSpc>
+              <a:spcBef>
+                <a:spcPct val="0"/>
+              </a:spcBef>
+              <a:spcAft>
+                <a:spcPct val="0"/>
+              </a:spcAft>
+            </a:pPr>
+            <a:endParaRPr lang="en-US" sz="2400" err="1">
+              <a:gradFill>
+                <a:gsLst>
+                  <a:gs pos="0">
+                    <a:srgbClr val="FFFFFF"/>
+                  </a:gs>
+                  <a:gs pos="100000">
+                    <a:srgbClr val="FFFFFF"/>
+                  </a:gs>
+                </a:gsLst>
+                <a:lin ang="5400000" scaled="0"/>
+              </a:gradFill>
+              <a:ea typeface="Segoe UI" pitchFamily="34" charset="0"/>
+              <a:cs typeface="Segoe UI" pitchFamily="34" charset="0"/>
+            </a:endParaRPr>
+          </a:p>
+        </p:txBody>
+      </p:sp>
+      <p:sp>
+        <p:nvSpPr>
+          <p:cNvPr id="25" name="Rectangle 24">
+            <a:extLst>
+              <a:ext uri="{FF2B5EF4-FFF2-40B4-BE49-F238E27FC236}">
+                <a16:creationId xmlns:a16="http://schemas.microsoft.com/office/drawing/2014/main" id="{34DBF81F-4274-4E2A-AAB7-489C7A6E6394}"/>
+              </a:ext>
+            </a:extLst>
+          </p:cNvPr>
+          <p:cNvSpPr/>
+          <p:nvPr/>
+        </p:nvSpPr>
+        <p:spPr bwMode="auto">
+          <a:xfrm>
+            <a:off x="11442970" y="1188395"/>
+            <a:ext cx="249676" cy="71336"/>
+          </a:xfrm>
+          <a:prstGeom prst="rect">
+            <a:avLst/>
+          </a:prstGeom>
+          <a:solidFill>
+            <a:schemeClr val="bg1"/>
+          </a:solidFill>
+          <a:ln>
+            <a:noFill/>
+            <a:headEnd type="none" w="med" len="med"/>
+            <a:tailEnd type="none" w="med" len="med"/>
+          </a:ln>
+          <a:effectLst/>
+        </p:spPr>
+        <p:style>
+          <a:lnRef idx="1">
+            <a:schemeClr val="accent2"/>
+          </a:lnRef>
+          <a:fillRef idx="3">
+            <a:schemeClr val="accent2"/>
+          </a:fillRef>
+          <a:effectRef idx="2">
+            <a:schemeClr val="accent2"/>
+          </a:effectRef>
+          <a:fontRef idx="minor">
+            <a:schemeClr val="lt1"/>
+          </a:fontRef>
+        </p:style>
+        <p:txBody>
+          <a:bodyPr rot="0" spcFirstLastPara="0" vertOverflow="overflow" horzOverflow="overflow" vert="horz" wrap="square" lIns="182880" tIns="146304" rIns="182880" bIns="146304" numCol="1" spcCol="0" rtlCol="0" fromWordArt="0" anchor="t" anchorCtr="0" forceAA="0" compatLnSpc="1">
+            <a:prstTxWarp prst="textNoShape">
+              <a:avLst/>
+            </a:prstTxWarp>
+            <a:noAutofit/>
+          </a:bodyPr>
+          <a:lstStyle/>
+          <a:p>
+            <a:pPr algn="ctr" defTabSz="932472" fontAlgn="base">
+              <a:lnSpc>
+                <a:spcPct val="90000"/>
+              </a:lnSpc>
+              <a:spcBef>
+                <a:spcPct val="0"/>
+              </a:spcBef>
+              <a:spcAft>
+                <a:spcPct val="0"/>
+              </a:spcAft>
+            </a:pPr>
+            <a:endParaRPr lang="en-US" sz="2400" err="1">
+              <a:gradFill>
+                <a:gsLst>
+                  <a:gs pos="0">
+                    <a:srgbClr val="FFFFFF"/>
+                  </a:gs>
+                  <a:gs pos="100000">
+                    <a:srgbClr val="FFFFFF"/>
+                  </a:gs>
+                </a:gsLst>
+                <a:lin ang="5400000" scaled="0"/>
+              </a:gradFill>
+              <a:ea typeface="Segoe UI" pitchFamily="34" charset="0"/>
+              <a:cs typeface="Segoe UI" pitchFamily="34" charset="0"/>
+            </a:endParaRPr>
+          </a:p>
+        </p:txBody>
+      </p:sp>
+      <p:sp>
+        <p:nvSpPr>
+          <p:cNvPr id="26" name="Rectangle 25">
+            <a:extLst>
+              <a:ext uri="{FF2B5EF4-FFF2-40B4-BE49-F238E27FC236}">
+                <a16:creationId xmlns:a16="http://schemas.microsoft.com/office/drawing/2014/main" id="{9B6E6037-C806-4A4B-A60D-ABC4892E98B9}"/>
+              </a:ext>
+            </a:extLst>
+          </p:cNvPr>
+          <p:cNvSpPr/>
+          <p:nvPr/>
+        </p:nvSpPr>
+        <p:spPr bwMode="auto">
+          <a:xfrm>
+            <a:off x="11370012" y="1139756"/>
+            <a:ext cx="249676" cy="71336"/>
+          </a:xfrm>
+          <a:prstGeom prst="rect">
+            <a:avLst/>
+          </a:prstGeom>
+          <a:solidFill>
+            <a:schemeClr val="bg1"/>
+          </a:solidFill>
+          <a:ln>
+            <a:noFill/>
+            <a:headEnd type="none" w="med" len="med"/>
+            <a:tailEnd type="none" w="med" len="med"/>
+          </a:ln>
+          <a:effectLst/>
+        </p:spPr>
+        <p:style>
+          <a:lnRef idx="1">
+            <a:schemeClr val="accent2"/>
+          </a:lnRef>
+          <a:fillRef idx="3">
+            <a:schemeClr val="accent2"/>
+          </a:fillRef>
+          <a:effectRef idx="2">
+            <a:schemeClr val="accent2"/>
+          </a:effectRef>
+          <a:fontRef idx="minor">
+            <a:schemeClr val="lt1"/>
+          </a:fontRef>
+        </p:style>
+        <p:txBody>
+          <a:bodyPr rot="0" spcFirstLastPara="0" vertOverflow="overflow" horzOverflow="overflow" vert="horz" wrap="square" lIns="182880" tIns="146304" rIns="182880" bIns="146304" numCol="1" spcCol="0" rtlCol="0" fromWordArt="0" anchor="t" anchorCtr="0" forceAA="0" compatLnSpc="1">
+            <a:prstTxWarp prst="textNoShape">
+              <a:avLst/>
+            </a:prstTxWarp>
+            <a:noAutofit/>
+          </a:bodyPr>
+          <a:lstStyle/>
+          <a:p>
+            <a:pPr algn="ctr" defTabSz="932472" fontAlgn="base">
+              <a:lnSpc>
+                <a:spcPct val="90000"/>
+              </a:lnSpc>
+              <a:spcBef>
+                <a:spcPct val="0"/>
+              </a:spcBef>
+              <a:spcAft>
+                <a:spcPct val="0"/>
+              </a:spcAft>
+            </a:pPr>
+            <a:endParaRPr lang="en-US" sz="2400" err="1">
+              <a:gradFill>
+                <a:gsLst>
+                  <a:gs pos="0">
+                    <a:srgbClr val="FFFFFF"/>
+                  </a:gs>
+                  <a:gs pos="100000">
+                    <a:srgbClr val="FFFFFF"/>
+                  </a:gs>
+                </a:gsLst>
+                <a:lin ang="5400000" scaled="0"/>
+              </a:gradFill>
+              <a:ea typeface="Segoe UI" pitchFamily="34" charset="0"/>
+              <a:cs typeface="Segoe UI" pitchFamily="34" charset="0"/>
+            </a:endParaRPr>
+          </a:p>
+        </p:txBody>
+      </p:sp>
+    </p:spTree>
+    <p:extLst>
+      <p:ext uri="{BB962C8B-B14F-4D97-AF65-F5344CB8AC3E}">
+        <p14:creationId xmlns:p14="http://schemas.microsoft.com/office/powerpoint/2010/main" val="61042252"/>
+      </p:ext>
+    </p:extLst>
+  </p:cSld>
+  <p:clrMapOvr>
+    <a:masterClrMapping/>
+  </p:clrMapOvr>
+  <p:transition>
+    <p:fade/>
+  </p:transition>
+</p:sld>
+</file>
+
+<file path=ppt/slides/slide11.xml><?xml version="1.0" encoding="utf-8"?>
+<p:sld xmlns:a="http://schemas.openxmlformats.org/drawingml/2006/main" xmlns:r="http://schemas.openxmlformats.org/officeDocument/2006/relationships" xmlns:p="http://schemas.openxmlformats.org/presentationml/2006/main">
+  <p:cSld>
+    <p:spTree>
+      <p:nvGrpSpPr>
+        <p:cNvPr id="1" name=""/>
+        <p:cNvGrpSpPr/>
+        <p:nvPr/>
+      </p:nvGrpSpPr>
+      <p:grpSpPr>
+        <a:xfrm>
+          <a:off x="0" y="0"/>
+          <a:ext cx="0" cy="0"/>
+          <a:chOff x="0" y="0"/>
+          <a:chExt cx="0" cy="0"/>
+        </a:xfrm>
+      </p:grpSpPr>
+      <p:sp>
+        <p:nvSpPr>
+          <p:cNvPr id="2" name="Title 3">
+            <a:extLst>
+              <a:ext uri="{FF2B5EF4-FFF2-40B4-BE49-F238E27FC236}">
+                <a16:creationId xmlns:a16="http://schemas.microsoft.com/office/drawing/2014/main" id="{DB0B99EF-AA7B-47BE-944B-97BCFE08EEB3}"/>
+              </a:ext>
+            </a:extLst>
+          </p:cNvPr>
+          <p:cNvSpPr txBox="1">
+            <a:spLocks/>
+          </p:cNvSpPr>
+          <p:nvPr/>
+        </p:nvSpPr>
+        <p:spPr>
+          <a:xfrm>
+            <a:off x="584200" y="2425780"/>
+            <a:ext cx="9144000" cy="2942088"/>
+          </a:xfrm>
+          <a:prstGeom prst="rect">
+            <a:avLst/>
+          </a:prstGeom>
+        </p:spPr>
+        <p:txBody>
+          <a:bodyPr/>
+          <a:lstStyle>
+            <a:lvl1pPr algn="l" defTabSz="932742" rtl="0" eaLnBrk="1" latinLnBrk="0" hangingPunct="1">
+              <a:lnSpc>
+                <a:spcPct val="100000"/>
+              </a:lnSpc>
+              <a:spcBef>
+                <a:spcPct val="0"/>
+              </a:spcBef>
+              <a:buNone/>
+              <a:defRPr lang="en-US" sz="3600" b="0" kern="1200" cap="none" spc="-50" baseline="0" dirty="0" smtClean="0">
+                <a:ln w="3175">
+                  <a:noFill/>
+                </a:ln>
+                <a:solidFill>
+                  <a:schemeClr val="tx1"/>
+                </a:solidFill>
+                <a:effectLst/>
+                <a:latin typeface="+mj-lt"/>
+                <a:ea typeface="+mn-ea"/>
+                <a:cs typeface="Segoe UI" pitchFamily="34" charset="0"/>
+              </a:defRPr>
+            </a:lvl1pPr>
+          </a:lstStyle>
+          <a:p>
+            <a:r>
+              <a:rPr lang="en-US" b="1" dirty="0">
+                <a:solidFill>
+                  <a:srgbClr val="FFFFFF"/>
+                </a:solidFill>
+                <a:latin typeface="Segoe UI" panose="020B0502040204020203" pitchFamily="34" charset="0"/>
+              </a:rPr>
+              <a:t>Thank you!</a:t>
+            </a:r>
+          </a:p>
+          <a:p>
+            <a:endParaRPr lang="en-US" b="1" dirty="0">
+              <a:solidFill>
+                <a:srgbClr val="FFFFFF"/>
+              </a:solidFill>
+              <a:latin typeface="Segoe UI" panose="020B0502040204020203" pitchFamily="34" charset="0"/>
+            </a:endParaRPr>
+          </a:p>
+          <a:p>
+            <a:endParaRPr lang="en-US" b="1" dirty="0">
+              <a:solidFill>
+                <a:srgbClr val="FFFFFF"/>
+              </a:solidFill>
+              <a:latin typeface="Segoe UI" panose="020B0502040204020203" pitchFamily="34" charset="0"/>
+            </a:endParaRPr>
+          </a:p>
+          <a:p>
+            <a:r>
+              <a:rPr lang="en-US" b="1" dirty="0">
+                <a:solidFill>
+                  <a:srgbClr val="FFFFFF"/>
+                </a:solidFill>
+                <a:latin typeface="Segoe UI" panose="020B0502040204020203" pitchFamily="34" charset="0"/>
+              </a:rPr>
+              <a:t>Questions?</a:t>
+            </a:r>
+            <a:endParaRPr lang="en-US" dirty="0"/>
+          </a:p>
+        </p:txBody>
+      </p:sp>
+    </p:spTree>
+    <p:extLst>
+      <p:ext uri="{BB962C8B-B14F-4D97-AF65-F5344CB8AC3E}">
+        <p14:creationId xmlns:p14="http://schemas.microsoft.com/office/powerpoint/2010/main" val="1459196063"/>
+      </p:ext>
+    </p:extLst>
+  </p:cSld>
+  <p:clrMapOvr>
+    <a:masterClrMapping/>
+  </p:clrMapOvr>
+  <p:transition>
+    <p:fade/>
+  </p:transition>
+</p:sld>
+</file>
+
 <file path=ppt/slides/slide2.xml><?xml version="1.0" encoding="utf-8"?>
 <p:sld xmlns:a="http://schemas.openxmlformats.org/drawingml/2006/main" xmlns:r="http://schemas.openxmlformats.org/officeDocument/2006/relationships" xmlns:p="http://schemas.openxmlformats.org/presentationml/2006/main">
   <p:cSld>
@@ -55678,8 +56266,8 @@
         </p:nvSpPr>
         <p:spPr>
           <a:xfrm>
-            <a:off x="1055411" y="1469630"/>
-            <a:ext cx="10081178" cy="4111895"/>
+            <a:off x="1055411" y="1863804"/>
+            <a:ext cx="10081178" cy="3742563"/>
           </a:xfrm>
           <a:prstGeom prst="rect">
             <a:avLst/>
@@ -55760,6 +56348,15 @@
               <a:buChar char="•"/>
             </a:pPr>
             <a:r>
+              <a:rPr lang="en-US" sz="2800" b="0" dirty="0">
+                <a:solidFill>
+                  <a:srgbClr val="000000"/>
+                </a:solidFill>
+                <a:effectLst/>
+              </a:rPr>
+              <a:t>The </a:t>
+            </a:r>
+            <a:r>
               <a:rPr lang="en-US" sz="2800" b="0" dirty="0" err="1">
                 <a:solidFill>
                   <a:srgbClr val="000000"/>
@@ -55775,7 +56372,7 @@
                 </a:solidFill>
                 <a:effectLst/>
               </a:rPr>
-              <a:t> @ NPM - a helper library, and SDK reference</a:t>
+              <a:t> Package @ NPM</a:t>
             </a:r>
           </a:p>
           <a:p>
@@ -55807,11 +56404,6 @@
               </a:rPr>
               <a:t>Wrap up - Links and Other Repos of Interest</a:t>
             </a:r>
-          </a:p>
-          <a:p>
-            <a:endParaRPr lang="en-US" sz="2400" dirty="0">
-              <a:cs typeface="Segoe UI"/>
-            </a:endParaRPr>
           </a:p>
         </p:txBody>
       </p:sp>
@@ -56224,8 +56816,8 @@
         </p:nvSpPr>
         <p:spPr>
           <a:xfrm>
-            <a:off x="1055411" y="1469630"/>
-            <a:ext cx="10081178" cy="1095685"/>
+            <a:off x="1055411" y="1259731"/>
+            <a:ext cx="10081178" cy="5035225"/>
           </a:xfrm>
           <a:prstGeom prst="rect">
             <a:avLst/>
@@ -56241,24 +56833,348 @@
           </a:bodyPr>
           <a:lstStyle/>
           <a:p>
-            <a:pPr marL="457200" indent="-457200">
+            <a:pPr marL="342900" indent="-342900">
               <a:buFont typeface="Arial" panose="020B0604020202020204" pitchFamily="34" charset="0"/>
               <a:buChar char="•"/>
             </a:pPr>
             <a:r>
-              <a:rPr lang="en-US" sz="2800" b="0" dirty="0">
+              <a:rPr lang="en-US" sz="2400" b="0" dirty="0">
                 <a:solidFill>
                   <a:srgbClr val="000000"/>
                 </a:solidFill>
                 <a:effectLst/>
               </a:rPr>
-              <a:t>x</a:t>
-            </a:r>
-          </a:p>
-          <a:p>
+              <a:t>2021 - </a:t>
+            </a:r>
+            <a:r>
+              <a:rPr lang="en-US" sz="2400" b="1" dirty="0">
+                <a:solidFill>
+                  <a:srgbClr val="000000"/>
+                </a:solidFill>
+                <a:effectLst/>
+              </a:rPr>
+              <a:t>Microsoft - Cosmos DB Global Black Belt (GBB)</a:t>
+            </a:r>
+          </a:p>
+          <a:p>
+            <a:pPr marL="342900" indent="-342900">
+              <a:buFont typeface="Arial" panose="020B0604020202020204" pitchFamily="34" charset="0"/>
+              <a:buChar char="•"/>
+            </a:pPr>
+            <a:r>
+              <a:rPr lang="en-US" sz="2400" b="0" dirty="0">
+                <a:solidFill>
+                  <a:srgbClr val="000000"/>
+                </a:solidFill>
+                <a:effectLst/>
+              </a:rPr>
+              <a:t>2016 - Microsoft - Cloud Solution Architect</a:t>
+            </a:r>
+          </a:p>
+          <a:p>
+            <a:pPr marL="342900" indent="-342900">
+              <a:buFont typeface="Arial" panose="020B0604020202020204" pitchFamily="34" charset="0"/>
+              <a:buChar char="•"/>
+            </a:pPr>
+            <a:r>
+              <a:rPr lang="en-US" sz="2400" b="0" dirty="0">
+                <a:solidFill>
+                  <a:srgbClr val="000000"/>
+                </a:solidFill>
+                <a:effectLst/>
+              </a:rPr>
+              <a:t>1986 - 2016 - Software Developer, CTO, Owner</a:t>
+            </a:r>
+          </a:p>
+          <a:p>
+            <a:pPr marL="342900" indent="-342900">
+              <a:buFont typeface="Arial" panose="020B0604020202020204" pitchFamily="34" charset="0"/>
+              <a:buChar char="•"/>
+            </a:pPr>
+            <a:r>
+              <a:rPr lang="en-US" sz="2400" b="0" dirty="0">
+                <a:solidFill>
+                  <a:srgbClr val="000000"/>
+                </a:solidFill>
+                <a:effectLst/>
+              </a:rPr>
+              <a:t>Languages: </a:t>
+            </a:r>
+            <a:r>
+              <a:rPr lang="en-US" sz="2000" b="0" dirty="0">
+                <a:solidFill>
+                  <a:srgbClr val="000000"/>
+                </a:solidFill>
+                <a:effectLst/>
+              </a:rPr>
+              <a:t>COBOL -&gt; Smalltalk -&gt; Java -&gt; Ruby on Rails (</a:t>
+            </a:r>
+            <a:r>
+              <a:rPr lang="en-US" sz="2000" b="0" dirty="0" err="1">
+                <a:solidFill>
+                  <a:srgbClr val="000000"/>
+                </a:solidFill>
+                <a:effectLst/>
+              </a:rPr>
+              <a:t>RoR</a:t>
+            </a:r>
+            <a:r>
+              <a:rPr lang="en-US" sz="2000" b="0" dirty="0">
+                <a:solidFill>
+                  <a:srgbClr val="000000"/>
+                </a:solidFill>
+                <a:effectLst/>
+              </a:rPr>
+              <a:t>) -&gt; Node.js (MEAN) -&gt; Python -&gt; TypeScript.   Use </a:t>
+            </a:r>
+            <a:r>
+              <a:rPr lang="en-US" sz="2000" b="1" dirty="0" err="1">
+                <a:solidFill>
+                  <a:srgbClr val="000000"/>
+                </a:solidFill>
+                <a:effectLst/>
+              </a:rPr>
+              <a:t>CoffeeScript</a:t>
+            </a:r>
+            <a:r>
+              <a:rPr lang="en-US" sz="2000" b="0" dirty="0">
+                <a:solidFill>
+                  <a:srgbClr val="000000"/>
+                </a:solidFill>
+                <a:effectLst/>
+              </a:rPr>
+              <a:t> with </a:t>
+            </a:r>
+            <a:r>
+              <a:rPr lang="en-US" sz="2000" b="0" dirty="0" err="1">
+                <a:solidFill>
+                  <a:srgbClr val="000000"/>
+                </a:solidFill>
+                <a:effectLst/>
+              </a:rPr>
+              <a:t>RoR</a:t>
+            </a:r>
+            <a:r>
+              <a:rPr lang="en-US" sz="2000" b="0" dirty="0">
+                <a:solidFill>
+                  <a:srgbClr val="000000"/>
+                </a:solidFill>
+                <a:effectLst/>
+              </a:rPr>
+              <a:t> and the MEAN stack.</a:t>
+            </a:r>
+          </a:p>
+          <a:p>
+            <a:pPr marL="342900" indent="-342900">
+              <a:buFont typeface="Arial" panose="020B0604020202020204" pitchFamily="34" charset="0"/>
+              <a:buChar char="•"/>
+            </a:pPr>
+            <a:r>
+              <a:rPr lang="en-US" sz="2400" b="0" dirty="0">
+                <a:solidFill>
+                  <a:srgbClr val="000000"/>
+                </a:solidFill>
+                <a:effectLst/>
+              </a:rPr>
+              <a:t>Databases: </a:t>
+            </a:r>
+            <a:r>
+              <a:rPr lang="en-US" sz="2000" b="0" dirty="0">
+                <a:solidFill>
+                  <a:srgbClr val="000000"/>
+                </a:solidFill>
+                <a:effectLst/>
+              </a:rPr>
+              <a:t>IMS/DB, Relational (DB2, MySQL, PostgreSQL), </a:t>
+            </a:r>
+            <a:r>
+              <a:rPr lang="en-US" sz="2000" b="1" dirty="0">
+                <a:solidFill>
+                  <a:srgbClr val="000000"/>
+                </a:solidFill>
+                <a:effectLst/>
+              </a:rPr>
+              <a:t>MongoDB (2008),</a:t>
+            </a:r>
+            <a:r>
+              <a:rPr lang="en-US" sz="2000" dirty="0">
+                <a:solidFill>
+                  <a:srgbClr val="000000"/>
+                </a:solidFill>
+                <a:effectLst/>
+              </a:rPr>
+              <a:t> -&gt;</a:t>
+            </a:r>
+            <a:r>
+              <a:rPr lang="en-US" sz="2000" b="1" dirty="0">
+                <a:solidFill>
+                  <a:srgbClr val="000000"/>
+                </a:solidFill>
+                <a:effectLst/>
+              </a:rPr>
+              <a:t> Cosmos DB (2017)</a:t>
+            </a:r>
+          </a:p>
+          <a:p>
+            <a:pPr marL="342900" indent="-342900">
+              <a:buFont typeface="Arial" panose="020B0604020202020204" pitchFamily="34" charset="0"/>
+              <a:buChar char="•"/>
+            </a:pPr>
+            <a:r>
+              <a:rPr lang="en-US" sz="2400" b="0" dirty="0">
+                <a:solidFill>
+                  <a:srgbClr val="000000"/>
+                </a:solidFill>
+                <a:effectLst/>
+              </a:rPr>
+              <a:t>Preferences: Dynamic Languages and </a:t>
+            </a:r>
+            <a:r>
+              <a:rPr lang="en-US" sz="2400" b="0" dirty="0" err="1">
+                <a:solidFill>
+                  <a:srgbClr val="000000"/>
+                </a:solidFill>
+                <a:effectLst/>
+              </a:rPr>
+              <a:t>Schemaless</a:t>
+            </a:r>
+            <a:r>
+              <a:rPr lang="en-US" sz="2400" b="0" dirty="0">
+                <a:solidFill>
+                  <a:srgbClr val="000000"/>
+                </a:solidFill>
+                <a:effectLst/>
+              </a:rPr>
+              <a:t> JSON-based NoSQL</a:t>
+            </a:r>
+          </a:p>
+          <a:p>
+            <a:pPr marL="342900" indent="-342900">
+              <a:buFont typeface="Arial" panose="020B0604020202020204" pitchFamily="34" charset="0"/>
+              <a:buChar char="•"/>
+            </a:pPr>
+            <a:r>
+              <a:rPr lang="en-US" sz="2400" b="0" dirty="0">
+                <a:solidFill>
+                  <a:srgbClr val="000000"/>
+                </a:solidFill>
+                <a:effectLst/>
+              </a:rPr>
+              <a:t>Davidson/Charlotte, NC, USA</a:t>
+            </a:r>
+          </a:p>
+          <a:p>
+            <a:pPr marL="342900" indent="-342900">
+              <a:buFont typeface="Arial" panose="020B0604020202020204" pitchFamily="34" charset="0"/>
+              <a:buChar char="•"/>
+            </a:pPr>
+            <a:r>
+              <a:rPr lang="en-US" sz="2400" b="0" dirty="0">
+                <a:solidFill>
+                  <a:srgbClr val="000000"/>
+                </a:solidFill>
+                <a:effectLst/>
+              </a:rPr>
+              <a:t>LinkedIn: https://www.linkedin.com/in/chris-joakim-4859b89/</a:t>
+            </a:r>
+          </a:p>
+          <a:p>
+            <a:pPr marL="342900" indent="-342900">
+              <a:buFont typeface="Arial" panose="020B0604020202020204" pitchFamily="34" charset="0"/>
+              <a:buChar char="•"/>
+            </a:pPr>
+            <a:r>
+              <a:rPr lang="en-US" sz="2400" b="0" dirty="0">
+                <a:solidFill>
+                  <a:srgbClr val="000000"/>
+                </a:solidFill>
+                <a:effectLst/>
+              </a:rPr>
+              <a:t>GitHub: </a:t>
+            </a:r>
+            <a:r>
+              <a:rPr lang="en-US" sz="2400" b="0" dirty="0">
+                <a:solidFill>
+                  <a:srgbClr val="000000"/>
+                </a:solidFill>
+                <a:effectLst/>
+                <a:hlinkClick r:id="rId2"/>
+              </a:rPr>
+              <a:t>https://github.com/cjoakim</a:t>
+            </a:r>
             <a:endParaRPr lang="en-US" sz="2400" dirty="0">
-              <a:cs typeface="Segoe UI"/>
+              <a:solidFill>
+                <a:srgbClr val="000000"/>
+              </a:solidFill>
             </a:endParaRPr>
+          </a:p>
+          <a:p>
+            <a:pPr marL="342900" indent="-342900">
+              <a:buFont typeface="Arial" panose="020B0604020202020204" pitchFamily="34" charset="0"/>
+              <a:buChar char="•"/>
+            </a:pPr>
+            <a:r>
+              <a:rPr lang="en-US" sz="2400" b="1" dirty="0">
+                <a:solidFill>
+                  <a:srgbClr val="000000"/>
+                </a:solidFill>
+                <a:effectLst/>
+              </a:rPr>
+              <a:t>Why</a:t>
+            </a:r>
+            <a:r>
+              <a:rPr lang="en-US" sz="2400" b="0" dirty="0">
+                <a:solidFill>
+                  <a:srgbClr val="000000"/>
+                </a:solidFill>
+                <a:effectLst/>
+              </a:rPr>
+              <a:t> did I Highlight </a:t>
+            </a:r>
+            <a:r>
+              <a:rPr lang="en-US" sz="2400" b="1" dirty="0" err="1">
+                <a:solidFill>
+                  <a:srgbClr val="000000"/>
+                </a:solidFill>
+                <a:effectLst/>
+              </a:rPr>
+              <a:t>CoffeeScript</a:t>
+            </a:r>
+            <a:r>
+              <a:rPr lang="en-US" sz="2400" b="0" dirty="0">
+                <a:solidFill>
+                  <a:srgbClr val="000000"/>
+                </a:solidFill>
+                <a:effectLst/>
+              </a:rPr>
+              <a:t> and </a:t>
+            </a:r>
+            <a:r>
+              <a:rPr lang="en-US" sz="2400" b="1" dirty="0">
+                <a:solidFill>
+                  <a:srgbClr val="000000"/>
+                </a:solidFill>
+                <a:effectLst/>
+              </a:rPr>
+              <a:t>MongoDB</a:t>
+            </a:r>
+            <a:r>
+              <a:rPr lang="en-US" sz="2400" b="1" dirty="0">
+                <a:solidFill>
+                  <a:srgbClr val="000000"/>
+                </a:solidFill>
+              </a:rPr>
+              <a:t> &amp;</a:t>
+            </a:r>
+            <a:r>
+              <a:rPr lang="en-US" sz="2400" b="1" dirty="0">
+                <a:solidFill>
+                  <a:srgbClr val="000000"/>
+                </a:solidFill>
+                <a:effectLst/>
+              </a:rPr>
+              <a:t> Cosmos DB?</a:t>
+            </a:r>
           </a:p>
         </p:txBody>
       </p:sp>
@@ -56543,97 +57459,3354 @@
       </p:grpSpPr>
       <p:sp>
         <p:nvSpPr>
-          <p:cNvPr id="2" name="Title 3">
-            <a:extLst>
-              <a:ext uri="{FF2B5EF4-FFF2-40B4-BE49-F238E27FC236}">
-                <a16:creationId xmlns:a16="http://schemas.microsoft.com/office/drawing/2014/main" id="{DB0B99EF-AA7B-47BE-944B-97BCFE08EEB3}"/>
-              </a:ext>
-            </a:extLst>
-          </p:cNvPr>
-          <p:cNvSpPr txBox="1">
-            <a:spLocks/>
+          <p:cNvPr id="2" name="Title 1">
+            <a:extLst>
+              <a:ext uri="{FF2B5EF4-FFF2-40B4-BE49-F238E27FC236}">
+                <a16:creationId xmlns:a16="http://schemas.microsoft.com/office/drawing/2014/main" id="{E5BBB390-B73E-4812-940C-A2213C93E2DC}"/>
+              </a:ext>
+            </a:extLst>
+          </p:cNvPr>
+          <p:cNvSpPr>
+            <a:spLocks noGrp="1"/>
           </p:cNvSpPr>
+          <p:nvPr>
+            <p:ph type="title"/>
+          </p:nvPr>
+        </p:nvSpPr>
+        <p:spPr>
+          <a:xfrm>
+            <a:off x="455995" y="620428"/>
+            <a:ext cx="11306469" cy="397545"/>
+          </a:xfrm>
+        </p:spPr>
+        <p:txBody>
+          <a:bodyPr/>
+          <a:lstStyle/>
+          <a:p>
+            <a:r>
+              <a:rPr lang="en-US" dirty="0">
+                <a:solidFill>
+                  <a:schemeClr val="accent2">
+                    <a:lumMod val="60000"/>
+                    <a:lumOff val="40000"/>
+                  </a:schemeClr>
+                </a:solidFill>
+                <a:cs typeface="Segoe UI Semibold"/>
+              </a:rPr>
+              <a:t>Meet Azure Cosmos DB</a:t>
+            </a:r>
+            <a:endParaRPr lang="en-US" dirty="0">
+              <a:solidFill>
+                <a:schemeClr val="accent2">
+                  <a:lumMod val="60000"/>
+                  <a:lumOff val="40000"/>
+                </a:schemeClr>
+              </a:solidFill>
+            </a:endParaRPr>
+          </a:p>
+        </p:txBody>
+      </p:sp>
+      <p:sp>
+        <p:nvSpPr>
+          <p:cNvPr id="3" name="Text Placeholder 2">
+            <a:extLst>
+              <a:ext uri="{FF2B5EF4-FFF2-40B4-BE49-F238E27FC236}">
+                <a16:creationId xmlns:a16="http://schemas.microsoft.com/office/drawing/2014/main" id="{AC3E1E3F-8E9B-4AA3-AFD9-4D7278053F9A}"/>
+              </a:ext>
+            </a:extLst>
+          </p:cNvPr>
+          <p:cNvSpPr>
+            <a:spLocks noGrp="1"/>
+          </p:cNvSpPr>
+          <p:nvPr>
+            <p:ph type="body" sz="quarter" idx="10"/>
+          </p:nvPr>
+        </p:nvSpPr>
+        <p:spPr>
+          <a:xfrm>
+            <a:off x="455995" y="1922586"/>
+            <a:ext cx="9384447" cy="1200329"/>
+          </a:xfrm>
+        </p:spPr>
+        <p:txBody>
+          <a:bodyPr vert="horz" wrap="square" lIns="0" tIns="0" rIns="0" bIns="0" rtlCol="0" anchor="t">
+            <a:spAutoFit/>
+          </a:bodyPr>
+          <a:lstStyle/>
+          <a:p>
+            <a:pPr marL="280035" indent="-280035">
+              <a:lnSpc>
+                <a:spcPct val="150000"/>
+              </a:lnSpc>
+              <a:spcAft>
+                <a:spcPts val="588"/>
+              </a:spcAft>
+              <a:buFont typeface="Arial,Sans-Serif" panose="020B0604020202020204" pitchFamily="34" charset="0"/>
+            </a:pPr>
+            <a:endParaRPr lang="en-US">
+              <a:ea typeface="+mn-lt"/>
+              <a:cs typeface="+mn-lt"/>
+            </a:endParaRPr>
+          </a:p>
+          <a:p>
+            <a:pPr marL="280035" indent="-280035">
+              <a:lnSpc>
+                <a:spcPct val="90000"/>
+              </a:lnSpc>
+              <a:spcAft>
+                <a:spcPts val="588"/>
+              </a:spcAft>
+              <a:buFont typeface="Arial,Sans-Serif" panose="020B0604020202020204" pitchFamily="34" charset="0"/>
+              <a:buChar char="•"/>
+            </a:pPr>
+            <a:endParaRPr lang="en-US">
+              <a:ea typeface="+mn-lt"/>
+              <a:cs typeface="+mn-lt"/>
+            </a:endParaRPr>
+          </a:p>
+          <a:p>
+            <a:pPr marL="335915" indent="-335915"/>
+            <a:endParaRPr lang="en-US">
+              <a:ea typeface="+mn-lt"/>
+              <a:cs typeface="+mn-lt"/>
+            </a:endParaRPr>
+          </a:p>
+        </p:txBody>
+      </p:sp>
+      <p:sp>
+        <p:nvSpPr>
+          <p:cNvPr id="4" name="TextBox 3">
+            <a:extLst>
+              <a:ext uri="{FF2B5EF4-FFF2-40B4-BE49-F238E27FC236}">
+                <a16:creationId xmlns:a16="http://schemas.microsoft.com/office/drawing/2014/main" id="{40C999F7-4F4C-403D-A55C-E359CFC56B8B}"/>
+              </a:ext>
+            </a:extLst>
+          </p:cNvPr>
+          <p:cNvSpPr txBox="1"/>
           <p:nvPr/>
         </p:nvSpPr>
         <p:spPr>
           <a:xfrm>
-            <a:off x="584200" y="2425780"/>
-            <a:ext cx="9144000" cy="2942088"/>
+            <a:off x="788474" y="1139756"/>
+            <a:ext cx="10746597" cy="5466112"/>
           </a:xfrm>
           <a:prstGeom prst="rect">
             <a:avLst/>
           </a:prstGeom>
-        </p:spPr>
-        <p:txBody>
-          <a:bodyPr/>
-          <a:lstStyle>
-            <a:lvl1pPr algn="l" defTabSz="932742" rtl="0" eaLnBrk="1" latinLnBrk="0" hangingPunct="1">
+          <a:noFill/>
+        </p:spPr>
+        <p:txBody>
+          <a:bodyPr rot="0" spcFirstLastPara="0" vertOverflow="overflow" horzOverflow="overflow" vert="horz" wrap="square" lIns="182880" tIns="146304" rIns="182880" bIns="146304" numCol="1" spcCol="0" rtlCol="0" fromWordArt="0" anchor="t" anchorCtr="0" forceAA="0" compatLnSpc="1">
+            <a:prstTxWarp prst="textNoShape">
+              <a:avLst/>
+            </a:prstTxWarp>
+            <a:spAutoFit/>
+          </a:bodyPr>
+          <a:lstStyle/>
+          <a:p>
+            <a:pPr marL="342900" indent="-342900">
+              <a:buFont typeface="Arial" panose="020B0604020202020204" pitchFamily="34" charset="0"/>
+              <a:buChar char="•"/>
+            </a:pPr>
+            <a:r>
+              <a:rPr lang="en-US" sz="2400" dirty="0">
+                <a:solidFill>
+                  <a:srgbClr val="000000"/>
+                </a:solidFill>
+              </a:rPr>
+              <a:t>Cloud-Native family of NoSQL Databases</a:t>
+            </a:r>
+          </a:p>
+          <a:p>
+            <a:pPr marL="800083" lvl="1" indent="-342900">
+              <a:buFont typeface="Arial" panose="020B0604020202020204" pitchFamily="34" charset="0"/>
+              <a:buChar char="•"/>
+            </a:pPr>
+            <a:r>
+              <a:rPr lang="en-US" sz="2400" dirty="0">
+                <a:solidFill>
+                  <a:srgbClr val="000000"/>
+                </a:solidFill>
+              </a:rPr>
+              <a:t>Born in the cloud</a:t>
+            </a:r>
+          </a:p>
+          <a:p>
+            <a:pPr marL="800083" lvl="1" indent="-342900">
+              <a:buFont typeface="Arial" panose="020B0604020202020204" pitchFamily="34" charset="0"/>
+              <a:buChar char="•"/>
+            </a:pPr>
+            <a:r>
+              <a:rPr lang="en-US" sz="2400" dirty="0">
+                <a:solidFill>
+                  <a:srgbClr val="000000"/>
+                </a:solidFill>
+              </a:rPr>
+              <a:t>High Performance – single-digit </a:t>
+            </a:r>
+            <a:r>
+              <a:rPr lang="en-US" sz="2400" dirty="0" err="1">
+                <a:solidFill>
+                  <a:srgbClr val="000000"/>
+                </a:solidFill>
+              </a:rPr>
+              <a:t>ms</a:t>
+            </a:r>
+            <a:r>
+              <a:rPr lang="en-US" sz="2400" dirty="0">
+                <a:solidFill>
+                  <a:srgbClr val="000000"/>
+                </a:solidFill>
+              </a:rPr>
+              <a:t> queries</a:t>
+            </a:r>
+          </a:p>
+          <a:p>
+            <a:pPr marL="800083" lvl="1" indent="-342900">
+              <a:buFont typeface="Arial" panose="020B0604020202020204" pitchFamily="34" charset="0"/>
+              <a:buChar char="•"/>
+            </a:pPr>
+            <a:r>
+              <a:rPr lang="en-US" sz="2400" dirty="0">
+                <a:solidFill>
+                  <a:srgbClr val="000000"/>
+                </a:solidFill>
+              </a:rPr>
+              <a:t>High Availability – multiple copies of your data, 99.99 to 99.999% SLA</a:t>
+            </a:r>
+          </a:p>
+          <a:p>
+            <a:pPr marL="800083" lvl="1" indent="-342900">
+              <a:buFont typeface="Arial" panose="020B0604020202020204" pitchFamily="34" charset="0"/>
+              <a:buChar char="•"/>
+            </a:pPr>
+            <a:r>
+              <a:rPr lang="en-US" sz="2400" dirty="0">
+                <a:solidFill>
+                  <a:srgbClr val="000000"/>
+                </a:solidFill>
+              </a:rPr>
+              <a:t>Globally Replicated, on the high-speed Azure fiber network</a:t>
+            </a:r>
+          </a:p>
+          <a:p>
+            <a:pPr marL="342900" indent="-342900">
+              <a:buFont typeface="Arial" panose="020B0604020202020204" pitchFamily="34" charset="0"/>
+              <a:buChar char="•"/>
+            </a:pPr>
+            <a:r>
+              <a:rPr lang="en-US" sz="2400" dirty="0">
+                <a:solidFill>
+                  <a:srgbClr val="000000"/>
+                </a:solidFill>
+                <a:effectLst/>
+              </a:rPr>
+              <a:t>APIs: </a:t>
+            </a:r>
+            <a:r>
+              <a:rPr lang="en-US" sz="2400" b="1" dirty="0">
+                <a:solidFill>
+                  <a:srgbClr val="000000"/>
+                </a:solidFill>
+                <a:effectLst/>
+              </a:rPr>
+              <a:t>NoSQL</a:t>
+            </a:r>
+            <a:r>
+              <a:rPr lang="en-US" sz="2400" dirty="0">
+                <a:solidFill>
+                  <a:srgbClr val="000000"/>
+                </a:solidFill>
+                <a:effectLst/>
+              </a:rPr>
+              <a:t>, Mongo, Mongo </a:t>
+            </a:r>
+            <a:r>
+              <a:rPr lang="en-US" sz="2400" dirty="0" err="1">
+                <a:solidFill>
+                  <a:srgbClr val="000000"/>
+                </a:solidFill>
+                <a:effectLst/>
+              </a:rPr>
+              <a:t>vCore</a:t>
+            </a:r>
+            <a:r>
+              <a:rPr lang="en-US" sz="2400" dirty="0">
+                <a:solidFill>
+                  <a:srgbClr val="000000"/>
+                </a:solidFill>
+                <a:effectLst/>
+              </a:rPr>
+              <a:t>, Cassandra, Cassandra MI, Gremlin</a:t>
+            </a:r>
+          </a:p>
+          <a:p>
+            <a:pPr marL="342900" indent="-342900">
+              <a:buFont typeface="Arial" panose="020B0604020202020204" pitchFamily="34" charset="0"/>
+              <a:buChar char="•"/>
+            </a:pPr>
+            <a:r>
+              <a:rPr lang="en-US" sz="2400" dirty="0">
+                <a:solidFill>
+                  <a:srgbClr val="000000"/>
+                </a:solidFill>
+              </a:rPr>
+              <a:t>Dynamic Throughput Model with Request Units (RUs)</a:t>
+            </a:r>
+          </a:p>
+          <a:p>
+            <a:pPr marL="800083" lvl="1" indent="-342900">
+              <a:buFont typeface="Arial" panose="020B0604020202020204" pitchFamily="34" charset="0"/>
+              <a:buChar char="•"/>
+            </a:pPr>
+            <a:r>
+              <a:rPr lang="en-US" sz="2400" dirty="0">
+                <a:solidFill>
+                  <a:srgbClr val="000000"/>
+                </a:solidFill>
+                <a:effectLst/>
+              </a:rPr>
+              <a:t>Enables you to “righ</a:t>
+            </a:r>
+            <a:r>
+              <a:rPr lang="en-US" sz="2400" dirty="0">
+                <a:solidFill>
+                  <a:srgbClr val="000000"/>
+                </a:solidFill>
+              </a:rPr>
+              <a:t>t size” your Cosmos DB account and costs</a:t>
+            </a:r>
+          </a:p>
+          <a:p>
+            <a:pPr marL="342900" indent="-342900">
+              <a:buFont typeface="Arial" panose="020B0604020202020204" pitchFamily="34" charset="0"/>
+              <a:buChar char="•"/>
+            </a:pPr>
+            <a:r>
+              <a:rPr lang="en-US" sz="2400" dirty="0">
+                <a:solidFill>
+                  <a:srgbClr val="000000"/>
+                </a:solidFill>
+                <a:effectLst/>
+              </a:rPr>
+              <a:t>NoSQL API </a:t>
+            </a:r>
+            <a:r>
+              <a:rPr lang="en-US" sz="2400" dirty="0">
+                <a:solidFill>
+                  <a:srgbClr val="000000"/>
+                </a:solidFill>
+              </a:rPr>
+              <a:t>stores JSON Documents, but uses SQL for queries</a:t>
+            </a:r>
+          </a:p>
+          <a:p>
+            <a:pPr marL="342900" indent="-342900">
+              <a:buFont typeface="Arial" panose="020B0604020202020204" pitchFamily="34" charset="0"/>
+              <a:buChar char="•"/>
+            </a:pPr>
+            <a:r>
+              <a:rPr lang="en-US" sz="2400" dirty="0">
+                <a:solidFill>
+                  <a:srgbClr val="000000"/>
+                </a:solidFill>
+              </a:rPr>
+              <a:t>Enables high-performance “end-to-end JSON” applications</a:t>
+            </a:r>
+          </a:p>
+          <a:p>
+            <a:pPr marL="342900" indent="-342900">
+              <a:buFont typeface="Arial" panose="020B0604020202020204" pitchFamily="34" charset="0"/>
+              <a:buChar char="•"/>
+            </a:pPr>
+            <a:r>
+              <a:rPr lang="en-US" sz="2400" dirty="0">
+                <a:solidFill>
+                  <a:srgbClr val="000000"/>
+                </a:solidFill>
+              </a:rPr>
+              <a:t>Change-Feed for “event driven” apps with serverless Azure Functions</a:t>
+            </a:r>
+          </a:p>
+          <a:p>
+            <a:pPr marL="342900" indent="-342900">
+              <a:buFont typeface="Arial" panose="020B0604020202020204" pitchFamily="34" charset="0"/>
+              <a:buChar char="•"/>
+            </a:pPr>
+            <a:r>
+              <a:rPr lang="en-US" sz="2400" dirty="0">
+                <a:solidFill>
+                  <a:srgbClr val="000000"/>
+                </a:solidFill>
+              </a:rPr>
+              <a:t>Synapse Link for analytics and batch </a:t>
+            </a:r>
+          </a:p>
+          <a:p>
+            <a:pPr marL="342900" indent="-342900">
+              <a:buFont typeface="Arial" panose="020B0604020202020204" pitchFamily="34" charset="0"/>
+              <a:buChar char="•"/>
+            </a:pPr>
+            <a:r>
+              <a:rPr lang="en-US" sz="2400" dirty="0">
+                <a:solidFill>
+                  <a:srgbClr val="000000"/>
+                </a:solidFill>
+                <a:hlinkClick r:id="rId2"/>
+              </a:rPr>
+              <a:t>https://learn.microsoft.com/en-us/azure/cosmos-db/</a:t>
+            </a:r>
+            <a:endParaRPr lang="en-US" sz="2400" dirty="0">
+              <a:solidFill>
+                <a:srgbClr val="000000"/>
+              </a:solidFill>
+            </a:endParaRPr>
+          </a:p>
+          <a:p>
+            <a:pPr marL="800083" lvl="1" indent="-342900">
+              <a:buFont typeface="Arial" panose="020B0604020202020204" pitchFamily="34" charset="0"/>
+              <a:buChar char="•"/>
+            </a:pPr>
+            <a:endParaRPr lang="en-US" sz="2400" dirty="0">
+              <a:solidFill>
+                <a:srgbClr val="000000"/>
+              </a:solidFill>
+              <a:effectLst/>
+            </a:endParaRPr>
+          </a:p>
+        </p:txBody>
+      </p:sp>
+      <p:sp>
+        <p:nvSpPr>
+          <p:cNvPr id="9" name="Rectangle 8">
+            <a:extLst>
+              <a:ext uri="{FF2B5EF4-FFF2-40B4-BE49-F238E27FC236}">
+                <a16:creationId xmlns:a16="http://schemas.microsoft.com/office/drawing/2014/main" id="{E3743541-CC54-4122-901F-31E4C928C0B5}"/>
+              </a:ext>
+            </a:extLst>
+          </p:cNvPr>
+          <p:cNvSpPr/>
+          <p:nvPr/>
+        </p:nvSpPr>
+        <p:spPr bwMode="auto">
+          <a:xfrm>
+            <a:off x="5667829" y="968829"/>
+            <a:ext cx="914400" cy="152400"/>
+          </a:xfrm>
+          <a:prstGeom prst="rect">
+            <a:avLst/>
+          </a:prstGeom>
+          <a:solidFill>
+            <a:schemeClr val="bg1"/>
+          </a:solidFill>
+          <a:ln>
+            <a:noFill/>
+            <a:headEnd type="none" w="med" len="med"/>
+            <a:tailEnd type="none" w="med" len="med"/>
+          </a:ln>
+          <a:effectLst/>
+        </p:spPr>
+        <p:style>
+          <a:lnRef idx="1">
+            <a:schemeClr val="accent2"/>
+          </a:lnRef>
+          <a:fillRef idx="3">
+            <a:schemeClr val="accent2"/>
+          </a:fillRef>
+          <a:effectRef idx="2">
+            <a:schemeClr val="accent2"/>
+          </a:effectRef>
+          <a:fontRef idx="minor">
+            <a:schemeClr val="lt1"/>
+          </a:fontRef>
+        </p:style>
+        <p:txBody>
+          <a:bodyPr rot="0" spcFirstLastPara="0" vertOverflow="overflow" horzOverflow="overflow" vert="horz" wrap="square" lIns="182880" tIns="146304" rIns="182880" bIns="146304" numCol="1" spcCol="0" rtlCol="0" fromWordArt="0" anchor="t" anchorCtr="0" forceAA="0" compatLnSpc="1">
+            <a:prstTxWarp prst="textNoShape">
+              <a:avLst/>
+            </a:prstTxWarp>
+            <a:noAutofit/>
+          </a:bodyPr>
+          <a:lstStyle/>
+          <a:p>
+            <a:pPr algn="ctr" defTabSz="932472" fontAlgn="base">
               <a:lnSpc>
-                <a:spcPct val="100000"/>
+                <a:spcPct val="90000"/>
               </a:lnSpc>
               <a:spcBef>
                 <a:spcPct val="0"/>
               </a:spcBef>
-              <a:buNone/>
-              <a:defRPr lang="en-US" sz="3600" b="0" kern="1200" cap="none" spc="-50" baseline="0" dirty="0" smtClean="0">
-                <a:ln w="3175">
-                  <a:noFill/>
-                </a:ln>
-                <a:solidFill>
-                  <a:schemeClr val="tx1"/>
-                </a:solidFill>
-                <a:effectLst/>
-                <a:latin typeface="+mj-lt"/>
-                <a:ea typeface="+mn-ea"/>
-                <a:cs typeface="Segoe UI" pitchFamily="34" charset="0"/>
-              </a:defRPr>
-            </a:lvl1pPr>
-          </a:lstStyle>
-          <a:p>
-            <a:r>
-              <a:rPr lang="en-US" b="1" dirty="0">
-                <a:solidFill>
-                  <a:srgbClr val="FFFFFF"/>
-                </a:solidFill>
-                <a:latin typeface="Segoe UI" panose="020B0502040204020203" pitchFamily="34" charset="0"/>
-              </a:rPr>
-              <a:t>Thank you!</a:t>
-            </a:r>
-          </a:p>
-          <a:p>
-            <a:endParaRPr lang="en-US" b="1" dirty="0">
-              <a:solidFill>
-                <a:srgbClr val="FFFFFF"/>
-              </a:solidFill>
-              <a:latin typeface="Segoe UI" panose="020B0502040204020203" pitchFamily="34" charset="0"/>
+              <a:spcAft>
+                <a:spcPct val="0"/>
+              </a:spcAft>
+            </a:pPr>
+            <a:endParaRPr lang="en-US" sz="2400" err="1">
+              <a:gradFill>
+                <a:gsLst>
+                  <a:gs pos="0">
+                    <a:srgbClr val="FFFFFF"/>
+                  </a:gs>
+                  <a:gs pos="100000">
+                    <a:srgbClr val="FFFFFF"/>
+                  </a:gs>
+                </a:gsLst>
+                <a:lin ang="5400000" scaled="0"/>
+              </a:gradFill>
+              <a:ea typeface="Segoe UI" pitchFamily="34" charset="0"/>
+              <a:cs typeface="Segoe UI" pitchFamily="34" charset="0"/>
             </a:endParaRPr>
           </a:p>
-          <a:p>
-            <a:endParaRPr lang="en-US" b="1" dirty="0">
-              <a:solidFill>
-                <a:srgbClr val="FFFFFF"/>
-              </a:solidFill>
-              <a:latin typeface="Segoe UI" panose="020B0502040204020203" pitchFamily="34" charset="0"/>
+        </p:txBody>
+      </p:sp>
+      <p:sp>
+        <p:nvSpPr>
+          <p:cNvPr id="25" name="Rectangle 24">
+            <a:extLst>
+              <a:ext uri="{FF2B5EF4-FFF2-40B4-BE49-F238E27FC236}">
+                <a16:creationId xmlns:a16="http://schemas.microsoft.com/office/drawing/2014/main" id="{34DBF81F-4274-4E2A-AAB7-489C7A6E6394}"/>
+              </a:ext>
+            </a:extLst>
+          </p:cNvPr>
+          <p:cNvSpPr/>
+          <p:nvPr/>
+        </p:nvSpPr>
+        <p:spPr bwMode="auto">
+          <a:xfrm>
+            <a:off x="11442970" y="1188395"/>
+            <a:ext cx="249676" cy="71336"/>
+          </a:xfrm>
+          <a:prstGeom prst="rect">
+            <a:avLst/>
+          </a:prstGeom>
+          <a:solidFill>
+            <a:schemeClr val="bg1"/>
+          </a:solidFill>
+          <a:ln>
+            <a:noFill/>
+            <a:headEnd type="none" w="med" len="med"/>
+            <a:tailEnd type="none" w="med" len="med"/>
+          </a:ln>
+          <a:effectLst/>
+        </p:spPr>
+        <p:style>
+          <a:lnRef idx="1">
+            <a:schemeClr val="accent2"/>
+          </a:lnRef>
+          <a:fillRef idx="3">
+            <a:schemeClr val="accent2"/>
+          </a:fillRef>
+          <a:effectRef idx="2">
+            <a:schemeClr val="accent2"/>
+          </a:effectRef>
+          <a:fontRef idx="minor">
+            <a:schemeClr val="lt1"/>
+          </a:fontRef>
+        </p:style>
+        <p:txBody>
+          <a:bodyPr rot="0" spcFirstLastPara="0" vertOverflow="overflow" horzOverflow="overflow" vert="horz" wrap="square" lIns="182880" tIns="146304" rIns="182880" bIns="146304" numCol="1" spcCol="0" rtlCol="0" fromWordArt="0" anchor="t" anchorCtr="0" forceAA="0" compatLnSpc="1">
+            <a:prstTxWarp prst="textNoShape">
+              <a:avLst/>
+            </a:prstTxWarp>
+            <a:noAutofit/>
+          </a:bodyPr>
+          <a:lstStyle/>
+          <a:p>
+            <a:pPr algn="ctr" defTabSz="932472" fontAlgn="base">
+              <a:lnSpc>
+                <a:spcPct val="90000"/>
+              </a:lnSpc>
+              <a:spcBef>
+                <a:spcPct val="0"/>
+              </a:spcBef>
+              <a:spcAft>
+                <a:spcPct val="0"/>
+              </a:spcAft>
+            </a:pPr>
+            <a:endParaRPr lang="en-US" sz="2400" err="1">
+              <a:gradFill>
+                <a:gsLst>
+                  <a:gs pos="0">
+                    <a:srgbClr val="FFFFFF"/>
+                  </a:gs>
+                  <a:gs pos="100000">
+                    <a:srgbClr val="FFFFFF"/>
+                  </a:gs>
+                </a:gsLst>
+                <a:lin ang="5400000" scaled="0"/>
+              </a:gradFill>
+              <a:ea typeface="Segoe UI" pitchFamily="34" charset="0"/>
+              <a:cs typeface="Segoe UI" pitchFamily="34" charset="0"/>
             </a:endParaRPr>
           </a:p>
-          <a:p>
-            <a:r>
-              <a:rPr lang="en-US" b="1" dirty="0">
-                <a:solidFill>
-                  <a:srgbClr val="FFFFFF"/>
-                </a:solidFill>
-                <a:latin typeface="Segoe UI" panose="020B0502040204020203" pitchFamily="34" charset="0"/>
-              </a:rPr>
-              <a:t>Questions?</a:t>
-            </a:r>
-            <a:endParaRPr lang="en-US" dirty="0"/>
+        </p:txBody>
+      </p:sp>
+      <p:sp>
+        <p:nvSpPr>
+          <p:cNvPr id="26" name="Rectangle 25">
+            <a:extLst>
+              <a:ext uri="{FF2B5EF4-FFF2-40B4-BE49-F238E27FC236}">
+                <a16:creationId xmlns:a16="http://schemas.microsoft.com/office/drawing/2014/main" id="{9B6E6037-C806-4A4B-A60D-ABC4892E98B9}"/>
+              </a:ext>
+            </a:extLst>
+          </p:cNvPr>
+          <p:cNvSpPr/>
+          <p:nvPr/>
+        </p:nvSpPr>
+        <p:spPr bwMode="auto">
+          <a:xfrm>
+            <a:off x="11370012" y="1139756"/>
+            <a:ext cx="249676" cy="71336"/>
+          </a:xfrm>
+          <a:prstGeom prst="rect">
+            <a:avLst/>
+          </a:prstGeom>
+          <a:solidFill>
+            <a:schemeClr val="bg1"/>
+          </a:solidFill>
+          <a:ln>
+            <a:noFill/>
+            <a:headEnd type="none" w="med" len="med"/>
+            <a:tailEnd type="none" w="med" len="med"/>
+          </a:ln>
+          <a:effectLst/>
+        </p:spPr>
+        <p:style>
+          <a:lnRef idx="1">
+            <a:schemeClr val="accent2"/>
+          </a:lnRef>
+          <a:fillRef idx="3">
+            <a:schemeClr val="accent2"/>
+          </a:fillRef>
+          <a:effectRef idx="2">
+            <a:schemeClr val="accent2"/>
+          </a:effectRef>
+          <a:fontRef idx="minor">
+            <a:schemeClr val="lt1"/>
+          </a:fontRef>
+        </p:style>
+        <p:txBody>
+          <a:bodyPr rot="0" spcFirstLastPara="0" vertOverflow="overflow" horzOverflow="overflow" vert="horz" wrap="square" lIns="182880" tIns="146304" rIns="182880" bIns="146304" numCol="1" spcCol="0" rtlCol="0" fromWordArt="0" anchor="t" anchorCtr="0" forceAA="0" compatLnSpc="1">
+            <a:prstTxWarp prst="textNoShape">
+              <a:avLst/>
+            </a:prstTxWarp>
+            <a:noAutofit/>
+          </a:bodyPr>
+          <a:lstStyle/>
+          <a:p>
+            <a:pPr algn="ctr" defTabSz="932472" fontAlgn="base">
+              <a:lnSpc>
+                <a:spcPct val="90000"/>
+              </a:lnSpc>
+              <a:spcBef>
+                <a:spcPct val="0"/>
+              </a:spcBef>
+              <a:spcAft>
+                <a:spcPct val="0"/>
+              </a:spcAft>
+            </a:pPr>
+            <a:endParaRPr lang="en-US" sz="2400" err="1">
+              <a:gradFill>
+                <a:gsLst>
+                  <a:gs pos="0">
+                    <a:srgbClr val="FFFFFF"/>
+                  </a:gs>
+                  <a:gs pos="100000">
+                    <a:srgbClr val="FFFFFF"/>
+                  </a:gs>
+                </a:gsLst>
+                <a:lin ang="5400000" scaled="0"/>
+              </a:gradFill>
+              <a:ea typeface="Segoe UI" pitchFamily="34" charset="0"/>
+              <a:cs typeface="Segoe UI" pitchFamily="34" charset="0"/>
+            </a:endParaRPr>
           </a:p>
         </p:txBody>
       </p:sp>
     </p:spTree>
     <p:extLst>
       <p:ext uri="{BB962C8B-B14F-4D97-AF65-F5344CB8AC3E}">
-        <p14:creationId xmlns:p14="http://schemas.microsoft.com/office/powerpoint/2010/main" val="1459196063"/>
+        <p14:creationId xmlns:p14="http://schemas.microsoft.com/office/powerpoint/2010/main" val="592263210"/>
+      </p:ext>
+    </p:extLst>
+  </p:cSld>
+  <p:clrMapOvr>
+    <a:masterClrMapping/>
+  </p:clrMapOvr>
+  <p:transition>
+    <p:fade/>
+  </p:transition>
+</p:sld>
+</file>
+
+<file path=ppt/slides/slide5.xml><?xml version="1.0" encoding="utf-8"?>
+<p:sld xmlns:a="http://schemas.openxmlformats.org/drawingml/2006/main" xmlns:r="http://schemas.openxmlformats.org/officeDocument/2006/relationships" xmlns:p="http://schemas.openxmlformats.org/presentationml/2006/main">
+  <p:cSld>
+    <p:spTree>
+      <p:nvGrpSpPr>
+        <p:cNvPr id="1" name=""/>
+        <p:cNvGrpSpPr/>
+        <p:nvPr/>
+      </p:nvGrpSpPr>
+      <p:grpSpPr>
+        <a:xfrm>
+          <a:off x="0" y="0"/>
+          <a:ext cx="0" cy="0"/>
+          <a:chOff x="0" y="0"/>
+          <a:chExt cx="0" cy="0"/>
+        </a:xfrm>
+      </p:grpSpPr>
+      <p:sp>
+        <p:nvSpPr>
+          <p:cNvPr id="2" name="Title 1">
+            <a:extLst>
+              <a:ext uri="{FF2B5EF4-FFF2-40B4-BE49-F238E27FC236}">
+                <a16:creationId xmlns:a16="http://schemas.microsoft.com/office/drawing/2014/main" id="{E5BBB390-B73E-4812-940C-A2213C93E2DC}"/>
+              </a:ext>
+            </a:extLst>
+          </p:cNvPr>
+          <p:cNvSpPr>
+            <a:spLocks noGrp="1"/>
+          </p:cNvSpPr>
+          <p:nvPr>
+            <p:ph type="title"/>
+          </p:nvPr>
+        </p:nvSpPr>
+        <p:spPr>
+          <a:xfrm>
+            <a:off x="455995" y="620428"/>
+            <a:ext cx="11306469" cy="397545"/>
+          </a:xfrm>
+        </p:spPr>
+        <p:txBody>
+          <a:bodyPr/>
+          <a:lstStyle/>
+          <a:p>
+            <a:r>
+              <a:rPr lang="en-US" dirty="0">
+                <a:solidFill>
+                  <a:schemeClr val="accent2">
+                    <a:lumMod val="60000"/>
+                    <a:lumOff val="40000"/>
+                  </a:schemeClr>
+                </a:solidFill>
+                <a:cs typeface="Segoe UI Semibold"/>
+              </a:rPr>
+              <a:t>The Azure Cosmos DB JavaScript/TypeScript SDK</a:t>
+            </a:r>
+            <a:endParaRPr lang="en-US" dirty="0">
+              <a:solidFill>
+                <a:schemeClr val="accent2">
+                  <a:lumMod val="60000"/>
+                  <a:lumOff val="40000"/>
+                </a:schemeClr>
+              </a:solidFill>
+            </a:endParaRPr>
+          </a:p>
+        </p:txBody>
+      </p:sp>
+      <p:sp>
+        <p:nvSpPr>
+          <p:cNvPr id="3" name="Text Placeholder 2">
+            <a:extLst>
+              <a:ext uri="{FF2B5EF4-FFF2-40B4-BE49-F238E27FC236}">
+                <a16:creationId xmlns:a16="http://schemas.microsoft.com/office/drawing/2014/main" id="{AC3E1E3F-8E9B-4AA3-AFD9-4D7278053F9A}"/>
+              </a:ext>
+            </a:extLst>
+          </p:cNvPr>
+          <p:cNvSpPr>
+            <a:spLocks noGrp="1"/>
+          </p:cNvSpPr>
+          <p:nvPr>
+            <p:ph type="body" sz="quarter" idx="10"/>
+          </p:nvPr>
+        </p:nvSpPr>
+        <p:spPr>
+          <a:xfrm>
+            <a:off x="455995" y="1922586"/>
+            <a:ext cx="9384447" cy="1200329"/>
+          </a:xfrm>
+        </p:spPr>
+        <p:txBody>
+          <a:bodyPr vert="horz" wrap="square" lIns="0" tIns="0" rIns="0" bIns="0" rtlCol="0" anchor="t">
+            <a:spAutoFit/>
+          </a:bodyPr>
+          <a:lstStyle/>
+          <a:p>
+            <a:pPr marL="280035" indent="-280035">
+              <a:lnSpc>
+                <a:spcPct val="150000"/>
+              </a:lnSpc>
+              <a:spcAft>
+                <a:spcPts val="588"/>
+              </a:spcAft>
+              <a:buFont typeface="Arial,Sans-Serif" panose="020B0604020202020204" pitchFamily="34" charset="0"/>
+            </a:pPr>
+            <a:endParaRPr lang="en-US">
+              <a:ea typeface="+mn-lt"/>
+              <a:cs typeface="+mn-lt"/>
+            </a:endParaRPr>
+          </a:p>
+          <a:p>
+            <a:pPr marL="280035" indent="-280035">
+              <a:lnSpc>
+                <a:spcPct val="90000"/>
+              </a:lnSpc>
+              <a:spcAft>
+                <a:spcPts val="588"/>
+              </a:spcAft>
+              <a:buFont typeface="Arial,Sans-Serif" panose="020B0604020202020204" pitchFamily="34" charset="0"/>
+              <a:buChar char="•"/>
+            </a:pPr>
+            <a:endParaRPr lang="en-US">
+              <a:ea typeface="+mn-lt"/>
+              <a:cs typeface="+mn-lt"/>
+            </a:endParaRPr>
+          </a:p>
+          <a:p>
+            <a:pPr marL="335915" indent="-335915"/>
+            <a:endParaRPr lang="en-US">
+              <a:ea typeface="+mn-lt"/>
+              <a:cs typeface="+mn-lt"/>
+            </a:endParaRPr>
+          </a:p>
+        </p:txBody>
+      </p:sp>
+      <p:sp>
+        <p:nvSpPr>
+          <p:cNvPr id="4" name="TextBox 3">
+            <a:extLst>
+              <a:ext uri="{FF2B5EF4-FFF2-40B4-BE49-F238E27FC236}">
+                <a16:creationId xmlns:a16="http://schemas.microsoft.com/office/drawing/2014/main" id="{40C999F7-4F4C-403D-A55C-E359CFC56B8B}"/>
+              </a:ext>
+            </a:extLst>
+          </p:cNvPr>
+          <p:cNvSpPr txBox="1"/>
+          <p:nvPr/>
+        </p:nvSpPr>
+        <p:spPr>
+          <a:xfrm>
+            <a:off x="1055411" y="1469630"/>
+            <a:ext cx="10081178" cy="5589222"/>
+          </a:xfrm>
+          <a:prstGeom prst="rect">
+            <a:avLst/>
+          </a:prstGeom>
+          <a:noFill/>
+        </p:spPr>
+        <p:txBody>
+          <a:bodyPr rot="0" spcFirstLastPara="0" vertOverflow="overflow" horzOverflow="overflow" vert="horz" wrap="square" lIns="182880" tIns="146304" rIns="182880" bIns="146304" numCol="1" spcCol="0" rtlCol="0" fromWordArt="0" anchor="t" anchorCtr="0" forceAA="0" compatLnSpc="1">
+            <a:prstTxWarp prst="textNoShape">
+              <a:avLst/>
+            </a:prstTxWarp>
+            <a:spAutoFit/>
+          </a:bodyPr>
+          <a:lstStyle/>
+          <a:p>
+            <a:pPr marL="457200" indent="-457200">
+              <a:buFont typeface="Arial" panose="020B0604020202020204" pitchFamily="34" charset="0"/>
+              <a:buChar char="•"/>
+            </a:pPr>
+            <a:r>
+              <a:rPr lang="en-US" sz="2000" b="0" dirty="0">
+                <a:solidFill>
+                  <a:srgbClr val="000000"/>
+                </a:solidFill>
+                <a:effectLst/>
+                <a:hlinkClick r:id="rId2"/>
+              </a:rPr>
+              <a:t>https://github.com/Azure/azure-sdk-for-js</a:t>
+            </a:r>
+            <a:endParaRPr lang="en-US" sz="2000" b="0" dirty="0">
+              <a:solidFill>
+                <a:srgbClr val="000000"/>
+              </a:solidFill>
+              <a:effectLst/>
+            </a:endParaRPr>
+          </a:p>
+          <a:p>
+            <a:pPr marL="457200" indent="-457200">
+              <a:buFont typeface="Arial" panose="020B0604020202020204" pitchFamily="34" charset="0"/>
+              <a:buChar char="•"/>
+            </a:pPr>
+            <a:r>
+              <a:rPr lang="en-US" sz="2000" b="0" dirty="0">
+                <a:solidFill>
+                  <a:srgbClr val="000000"/>
+                </a:solidFill>
+                <a:effectLst/>
+                <a:hlinkClick r:id="rId3"/>
+              </a:rPr>
+              <a:t>https://github.com/Azure/azure-sdk-for-js/tree/main/sdk/cosmosdb/cosmos</a:t>
+            </a:r>
+            <a:endParaRPr lang="en-US" sz="2000" b="0" dirty="0">
+              <a:solidFill>
+                <a:srgbClr val="000000"/>
+              </a:solidFill>
+              <a:effectLst/>
+            </a:endParaRPr>
+          </a:p>
+          <a:p>
+            <a:pPr marL="457200" indent="-457200">
+              <a:buFont typeface="Arial" panose="020B0604020202020204" pitchFamily="34" charset="0"/>
+              <a:buChar char="•"/>
+            </a:pPr>
+            <a:r>
+              <a:rPr lang="en-US" sz="2000" dirty="0">
+                <a:solidFill>
+                  <a:srgbClr val="000000"/>
+                </a:solidFill>
+                <a:hlinkClick r:id="rId4"/>
+              </a:rPr>
+              <a:t>https://www.npmjs.com/package/@azure/cosmos</a:t>
+            </a:r>
+            <a:endParaRPr lang="en-US" sz="2000" dirty="0">
+              <a:solidFill>
+                <a:srgbClr val="000000"/>
+              </a:solidFill>
+            </a:endParaRPr>
+          </a:p>
+          <a:p>
+            <a:pPr marL="457200" indent="-457200">
+              <a:buFont typeface="Arial" panose="020B0604020202020204" pitchFamily="34" charset="0"/>
+              <a:buChar char="•"/>
+            </a:pPr>
+            <a:endParaRPr lang="en-US" sz="2000" b="0" dirty="0">
+              <a:solidFill>
+                <a:srgbClr val="000000"/>
+              </a:solidFill>
+              <a:effectLst/>
+            </a:endParaRPr>
+          </a:p>
+          <a:p>
+            <a:pPr marL="457200" indent="-457200">
+              <a:buFont typeface="Arial" panose="020B0604020202020204" pitchFamily="34" charset="0"/>
+              <a:buChar char="•"/>
+            </a:pPr>
+            <a:r>
+              <a:rPr lang="en-US" sz="2000" dirty="0">
+                <a:solidFill>
+                  <a:srgbClr val="000000"/>
+                </a:solidFill>
+              </a:rPr>
+              <a:t>The Cosmos DB JavaScript SDK is part of the Azure JavaScript SDK</a:t>
+            </a:r>
+          </a:p>
+          <a:p>
+            <a:pPr marL="457200" indent="-457200">
+              <a:buFont typeface="Arial" panose="020B0604020202020204" pitchFamily="34" charset="0"/>
+              <a:buChar char="•"/>
+            </a:pPr>
+            <a:r>
+              <a:rPr lang="en-US" sz="2000" b="1" dirty="0">
+                <a:solidFill>
+                  <a:srgbClr val="000000"/>
+                </a:solidFill>
+              </a:rPr>
+              <a:t>It is written in TypeScript</a:t>
+            </a:r>
+            <a:r>
+              <a:rPr lang="en-US" sz="2000" dirty="0">
+                <a:solidFill>
+                  <a:srgbClr val="000000"/>
+                </a:solidFill>
+              </a:rPr>
+              <a:t>, and </a:t>
+            </a:r>
+            <a:r>
+              <a:rPr lang="en-US" sz="2000" dirty="0" err="1">
+                <a:solidFill>
+                  <a:srgbClr val="000000"/>
+                </a:solidFill>
+              </a:rPr>
+              <a:t>transpiled</a:t>
+            </a:r>
+            <a:r>
+              <a:rPr lang="en-US" sz="2000" dirty="0">
+                <a:solidFill>
+                  <a:srgbClr val="000000"/>
+                </a:solidFill>
+              </a:rPr>
+              <a:t> into JavaScript</a:t>
+            </a:r>
+          </a:p>
+          <a:p>
+            <a:pPr marL="457200" indent="-457200">
+              <a:buFont typeface="Arial" panose="020B0604020202020204" pitchFamily="34" charset="0"/>
+              <a:buChar char="•"/>
+            </a:pPr>
+            <a:r>
+              <a:rPr lang="en-US" sz="2000" b="0" dirty="0">
+                <a:solidFill>
+                  <a:srgbClr val="000000"/>
+                </a:solidFill>
+                <a:effectLst/>
+              </a:rPr>
+              <a:t>Current Version is </a:t>
+            </a:r>
+            <a:r>
+              <a:rPr lang="en-US" sz="2000" b="1" dirty="0">
+                <a:solidFill>
+                  <a:srgbClr val="000000"/>
+                </a:solidFill>
+                <a:effectLst/>
+              </a:rPr>
+              <a:t>4.0.</a:t>
+            </a:r>
+            <a:r>
+              <a:rPr lang="en-US" sz="2000" b="1" dirty="0">
+                <a:solidFill>
+                  <a:srgbClr val="000000"/>
+                </a:solidFill>
+              </a:rPr>
+              <a:t>0</a:t>
+            </a:r>
+            <a:r>
+              <a:rPr lang="en-US" sz="2000" dirty="0">
+                <a:solidFill>
+                  <a:srgbClr val="000000"/>
+                </a:solidFill>
+              </a:rPr>
+              <a:t> – adds excellent features</a:t>
+            </a:r>
+          </a:p>
+          <a:p>
+            <a:pPr marL="914383" lvl="1" indent="-457200">
+              <a:buFont typeface="Arial" panose="020B0604020202020204" pitchFamily="34" charset="0"/>
+              <a:buChar char="•"/>
+            </a:pPr>
+            <a:r>
+              <a:rPr lang="en-US" sz="2000" dirty="0">
+                <a:solidFill>
+                  <a:srgbClr val="000000"/>
+                </a:solidFill>
+              </a:rPr>
+              <a:t>Throughput Control, </a:t>
+            </a:r>
+            <a:r>
+              <a:rPr lang="en-US" sz="2000" dirty="0">
+                <a:solidFill>
+                  <a:srgbClr val="111111"/>
+                </a:solidFill>
+                <a:latin typeface="Source Sans Pro" panose="020B0503030403020204" pitchFamily="34" charset="0"/>
+              </a:rPr>
+              <a:t>H</a:t>
+            </a:r>
+            <a:r>
+              <a:rPr lang="en-US" sz="2000" i="0" dirty="0">
+                <a:solidFill>
+                  <a:srgbClr val="111111"/>
+                </a:solidFill>
+                <a:effectLst/>
+                <a:latin typeface="Source Sans Pro" panose="020B0503030403020204" pitchFamily="34" charset="0"/>
+              </a:rPr>
+              <a:t>ierarchical </a:t>
+            </a:r>
+            <a:r>
+              <a:rPr lang="en-US" sz="2000" dirty="0">
+                <a:solidFill>
+                  <a:srgbClr val="111111"/>
+                </a:solidFill>
+                <a:latin typeface="Source Sans Pro" panose="020B0503030403020204" pitchFamily="34" charset="0"/>
+              </a:rPr>
+              <a:t>P</a:t>
+            </a:r>
+            <a:r>
+              <a:rPr lang="en-US" sz="2000" i="0" dirty="0">
+                <a:solidFill>
+                  <a:srgbClr val="111111"/>
+                </a:solidFill>
+                <a:effectLst/>
+                <a:latin typeface="Source Sans Pro" panose="020B0503030403020204" pitchFamily="34" charset="0"/>
+              </a:rPr>
+              <a:t>artition keys</a:t>
+            </a:r>
+            <a:r>
+              <a:rPr lang="en-US" sz="2000" dirty="0">
+                <a:solidFill>
+                  <a:srgbClr val="000000"/>
+                </a:solidFill>
+              </a:rPr>
+              <a:t>, Async</a:t>
+            </a:r>
+          </a:p>
+          <a:p>
+            <a:pPr marL="457200" indent="-457200">
+              <a:buFont typeface="Arial" panose="020B0604020202020204" pitchFamily="34" charset="0"/>
+              <a:buChar char="•"/>
+            </a:pPr>
+            <a:r>
+              <a:rPr lang="en-US" sz="2000" dirty="0">
+                <a:solidFill>
+                  <a:srgbClr val="000000"/>
+                </a:solidFill>
+              </a:rPr>
+              <a:t>Supports </a:t>
+            </a:r>
+            <a:r>
+              <a:rPr lang="en-US" sz="2000" b="1" dirty="0">
+                <a:solidFill>
+                  <a:srgbClr val="000000"/>
+                </a:solidFill>
+              </a:rPr>
+              <a:t>Asynchronous</a:t>
+            </a:r>
+            <a:r>
+              <a:rPr lang="en-US" sz="2000" dirty="0">
+                <a:solidFill>
+                  <a:srgbClr val="000000"/>
+                </a:solidFill>
+              </a:rPr>
+              <a:t> Operations – await/async</a:t>
+            </a:r>
+          </a:p>
+          <a:p>
+            <a:pPr marL="457200" indent="-457200">
+              <a:buFont typeface="Arial" panose="020B0604020202020204" pitchFamily="34" charset="0"/>
+              <a:buChar char="•"/>
+            </a:pPr>
+            <a:r>
+              <a:rPr lang="en-US" sz="2000" dirty="0" err="1">
+                <a:solidFill>
+                  <a:srgbClr val="000000"/>
+                </a:solidFill>
+              </a:rPr>
+              <a:t>n</a:t>
+            </a:r>
+            <a:r>
+              <a:rPr lang="en-US" sz="2000" b="0" dirty="0" err="1">
+                <a:solidFill>
+                  <a:srgbClr val="000000"/>
+                </a:solidFill>
+                <a:effectLst/>
+              </a:rPr>
+              <a:t>pm</a:t>
+            </a:r>
+            <a:r>
+              <a:rPr lang="en-US" sz="2000" b="0" dirty="0">
+                <a:solidFill>
+                  <a:srgbClr val="000000"/>
+                </a:solidFill>
+                <a:effectLst/>
+              </a:rPr>
+              <a:t> install </a:t>
+            </a:r>
+            <a:r>
+              <a:rPr lang="en-US" sz="2000" b="0" dirty="0">
+                <a:solidFill>
+                  <a:srgbClr val="0451A5"/>
+                </a:solidFill>
+                <a:effectLst/>
+                <a:latin typeface="Consolas" panose="020B0609020204030204" pitchFamily="49" charset="0"/>
+              </a:rPr>
+              <a:t>@azure/cosmos</a:t>
+            </a:r>
+            <a:endParaRPr lang="en-US" sz="2000" b="0" dirty="0">
+              <a:solidFill>
+                <a:srgbClr val="000000"/>
+              </a:solidFill>
+              <a:effectLst/>
+              <a:latin typeface="Consolas" panose="020B0609020204030204" pitchFamily="49" charset="0"/>
+            </a:endParaRPr>
+          </a:p>
+          <a:p>
+            <a:endParaRPr lang="en-US" sz="2000" b="0" dirty="0">
+              <a:solidFill>
+                <a:srgbClr val="000000"/>
+              </a:solidFill>
+              <a:effectLst/>
+            </a:endParaRPr>
+          </a:p>
+          <a:p>
+            <a:pPr marL="457200" indent="-457200">
+              <a:buFont typeface="Arial" panose="020B0604020202020204" pitchFamily="34" charset="0"/>
+              <a:buChar char="•"/>
+            </a:pPr>
+            <a:r>
+              <a:rPr lang="en-US" sz="2000" dirty="0">
+                <a:solidFill>
+                  <a:srgbClr val="000000"/>
+                </a:solidFill>
+              </a:rPr>
+              <a:t>Other Links:</a:t>
+            </a:r>
+            <a:endParaRPr lang="en-US" sz="2000" b="0" dirty="0">
+              <a:solidFill>
+                <a:srgbClr val="000000"/>
+              </a:solidFill>
+              <a:effectLst/>
+            </a:endParaRPr>
+          </a:p>
+          <a:p>
+            <a:pPr marL="457200" indent="-457200">
+              <a:buFont typeface="Arial" panose="020B0604020202020204" pitchFamily="34" charset="0"/>
+              <a:buChar char="•"/>
+            </a:pPr>
+            <a:r>
+              <a:rPr lang="en-US" sz="2000" b="0" dirty="0">
+                <a:solidFill>
+                  <a:srgbClr val="000000"/>
+                </a:solidFill>
+                <a:effectLst/>
+              </a:rPr>
+              <a:t>https://learn.microsoft.com/en-us/javascript/api/overview/azure/cosmos-readme?view=azure-node-latest</a:t>
+            </a:r>
+          </a:p>
+          <a:p>
+            <a:pPr marL="457200" indent="-457200">
+              <a:buFont typeface="Arial" panose="020B0604020202020204" pitchFamily="34" charset="0"/>
+              <a:buChar char="•"/>
+            </a:pPr>
+            <a:r>
+              <a:rPr lang="en-US" sz="2000" b="0" dirty="0">
+                <a:solidFill>
+                  <a:srgbClr val="000000"/>
+                </a:solidFill>
+                <a:effectLst/>
+              </a:rPr>
+              <a:t>https://learn.microsoft.com/en-us/</a:t>
+            </a:r>
+            <a:r>
+              <a:rPr lang="en-US" sz="2000" b="1" dirty="0">
+                <a:solidFill>
+                  <a:srgbClr val="000000"/>
+                </a:solidFill>
+                <a:effectLst/>
+              </a:rPr>
+              <a:t>samples</a:t>
+            </a:r>
+            <a:r>
+              <a:rPr lang="en-US" sz="2000" b="0" dirty="0">
+                <a:solidFill>
+                  <a:srgbClr val="000000"/>
+                </a:solidFill>
+                <a:effectLst/>
+              </a:rPr>
+              <a:t>/azure/azure-sdk-for-js/cosmos-typescript/</a:t>
+            </a:r>
+          </a:p>
+          <a:p>
+            <a:endParaRPr lang="en-US" sz="2400" dirty="0">
+              <a:cs typeface="Segoe UI"/>
+            </a:endParaRPr>
+          </a:p>
+        </p:txBody>
+      </p:sp>
+      <p:sp>
+        <p:nvSpPr>
+          <p:cNvPr id="9" name="Rectangle 8">
+            <a:extLst>
+              <a:ext uri="{FF2B5EF4-FFF2-40B4-BE49-F238E27FC236}">
+                <a16:creationId xmlns:a16="http://schemas.microsoft.com/office/drawing/2014/main" id="{E3743541-CC54-4122-901F-31E4C928C0B5}"/>
+              </a:ext>
+            </a:extLst>
+          </p:cNvPr>
+          <p:cNvSpPr/>
+          <p:nvPr/>
+        </p:nvSpPr>
+        <p:spPr bwMode="auto">
+          <a:xfrm>
+            <a:off x="5667829" y="968829"/>
+            <a:ext cx="914400" cy="152400"/>
+          </a:xfrm>
+          <a:prstGeom prst="rect">
+            <a:avLst/>
+          </a:prstGeom>
+          <a:solidFill>
+            <a:schemeClr val="bg1"/>
+          </a:solidFill>
+          <a:ln>
+            <a:noFill/>
+            <a:headEnd type="none" w="med" len="med"/>
+            <a:tailEnd type="none" w="med" len="med"/>
+          </a:ln>
+          <a:effectLst/>
+        </p:spPr>
+        <p:style>
+          <a:lnRef idx="1">
+            <a:schemeClr val="accent2"/>
+          </a:lnRef>
+          <a:fillRef idx="3">
+            <a:schemeClr val="accent2"/>
+          </a:fillRef>
+          <a:effectRef idx="2">
+            <a:schemeClr val="accent2"/>
+          </a:effectRef>
+          <a:fontRef idx="minor">
+            <a:schemeClr val="lt1"/>
+          </a:fontRef>
+        </p:style>
+        <p:txBody>
+          <a:bodyPr rot="0" spcFirstLastPara="0" vertOverflow="overflow" horzOverflow="overflow" vert="horz" wrap="square" lIns="182880" tIns="146304" rIns="182880" bIns="146304" numCol="1" spcCol="0" rtlCol="0" fromWordArt="0" anchor="t" anchorCtr="0" forceAA="0" compatLnSpc="1">
+            <a:prstTxWarp prst="textNoShape">
+              <a:avLst/>
+            </a:prstTxWarp>
+            <a:noAutofit/>
+          </a:bodyPr>
+          <a:lstStyle/>
+          <a:p>
+            <a:pPr algn="ctr" defTabSz="932472" fontAlgn="base">
+              <a:lnSpc>
+                <a:spcPct val="90000"/>
+              </a:lnSpc>
+              <a:spcBef>
+                <a:spcPct val="0"/>
+              </a:spcBef>
+              <a:spcAft>
+                <a:spcPct val="0"/>
+              </a:spcAft>
+            </a:pPr>
+            <a:endParaRPr lang="en-US" sz="2400" err="1">
+              <a:gradFill>
+                <a:gsLst>
+                  <a:gs pos="0">
+                    <a:srgbClr val="FFFFFF"/>
+                  </a:gs>
+                  <a:gs pos="100000">
+                    <a:srgbClr val="FFFFFF"/>
+                  </a:gs>
+                </a:gsLst>
+                <a:lin ang="5400000" scaled="0"/>
+              </a:gradFill>
+              <a:ea typeface="Segoe UI" pitchFamily="34" charset="0"/>
+              <a:cs typeface="Segoe UI" pitchFamily="34" charset="0"/>
+            </a:endParaRPr>
+          </a:p>
+        </p:txBody>
+      </p:sp>
+      <p:sp>
+        <p:nvSpPr>
+          <p:cNvPr id="25" name="Rectangle 24">
+            <a:extLst>
+              <a:ext uri="{FF2B5EF4-FFF2-40B4-BE49-F238E27FC236}">
+                <a16:creationId xmlns:a16="http://schemas.microsoft.com/office/drawing/2014/main" id="{34DBF81F-4274-4E2A-AAB7-489C7A6E6394}"/>
+              </a:ext>
+            </a:extLst>
+          </p:cNvPr>
+          <p:cNvSpPr/>
+          <p:nvPr/>
+        </p:nvSpPr>
+        <p:spPr bwMode="auto">
+          <a:xfrm>
+            <a:off x="11442970" y="1188395"/>
+            <a:ext cx="249676" cy="71336"/>
+          </a:xfrm>
+          <a:prstGeom prst="rect">
+            <a:avLst/>
+          </a:prstGeom>
+          <a:solidFill>
+            <a:schemeClr val="bg1"/>
+          </a:solidFill>
+          <a:ln>
+            <a:noFill/>
+            <a:headEnd type="none" w="med" len="med"/>
+            <a:tailEnd type="none" w="med" len="med"/>
+          </a:ln>
+          <a:effectLst/>
+        </p:spPr>
+        <p:style>
+          <a:lnRef idx="1">
+            <a:schemeClr val="accent2"/>
+          </a:lnRef>
+          <a:fillRef idx="3">
+            <a:schemeClr val="accent2"/>
+          </a:fillRef>
+          <a:effectRef idx="2">
+            <a:schemeClr val="accent2"/>
+          </a:effectRef>
+          <a:fontRef idx="minor">
+            <a:schemeClr val="lt1"/>
+          </a:fontRef>
+        </p:style>
+        <p:txBody>
+          <a:bodyPr rot="0" spcFirstLastPara="0" vertOverflow="overflow" horzOverflow="overflow" vert="horz" wrap="square" lIns="182880" tIns="146304" rIns="182880" bIns="146304" numCol="1" spcCol="0" rtlCol="0" fromWordArt="0" anchor="t" anchorCtr="0" forceAA="0" compatLnSpc="1">
+            <a:prstTxWarp prst="textNoShape">
+              <a:avLst/>
+            </a:prstTxWarp>
+            <a:noAutofit/>
+          </a:bodyPr>
+          <a:lstStyle/>
+          <a:p>
+            <a:pPr algn="ctr" defTabSz="932472" fontAlgn="base">
+              <a:lnSpc>
+                <a:spcPct val="90000"/>
+              </a:lnSpc>
+              <a:spcBef>
+                <a:spcPct val="0"/>
+              </a:spcBef>
+              <a:spcAft>
+                <a:spcPct val="0"/>
+              </a:spcAft>
+            </a:pPr>
+            <a:endParaRPr lang="en-US" sz="2400" err="1">
+              <a:gradFill>
+                <a:gsLst>
+                  <a:gs pos="0">
+                    <a:srgbClr val="FFFFFF"/>
+                  </a:gs>
+                  <a:gs pos="100000">
+                    <a:srgbClr val="FFFFFF"/>
+                  </a:gs>
+                </a:gsLst>
+                <a:lin ang="5400000" scaled="0"/>
+              </a:gradFill>
+              <a:ea typeface="Segoe UI" pitchFamily="34" charset="0"/>
+              <a:cs typeface="Segoe UI" pitchFamily="34" charset="0"/>
+            </a:endParaRPr>
+          </a:p>
+        </p:txBody>
+      </p:sp>
+      <p:sp>
+        <p:nvSpPr>
+          <p:cNvPr id="26" name="Rectangle 25">
+            <a:extLst>
+              <a:ext uri="{FF2B5EF4-FFF2-40B4-BE49-F238E27FC236}">
+                <a16:creationId xmlns:a16="http://schemas.microsoft.com/office/drawing/2014/main" id="{9B6E6037-C806-4A4B-A60D-ABC4892E98B9}"/>
+              </a:ext>
+            </a:extLst>
+          </p:cNvPr>
+          <p:cNvSpPr/>
+          <p:nvPr/>
+        </p:nvSpPr>
+        <p:spPr bwMode="auto">
+          <a:xfrm>
+            <a:off x="11370012" y="1139756"/>
+            <a:ext cx="249676" cy="71336"/>
+          </a:xfrm>
+          <a:prstGeom prst="rect">
+            <a:avLst/>
+          </a:prstGeom>
+          <a:solidFill>
+            <a:schemeClr val="bg1"/>
+          </a:solidFill>
+          <a:ln>
+            <a:noFill/>
+            <a:headEnd type="none" w="med" len="med"/>
+            <a:tailEnd type="none" w="med" len="med"/>
+          </a:ln>
+          <a:effectLst/>
+        </p:spPr>
+        <p:style>
+          <a:lnRef idx="1">
+            <a:schemeClr val="accent2"/>
+          </a:lnRef>
+          <a:fillRef idx="3">
+            <a:schemeClr val="accent2"/>
+          </a:fillRef>
+          <a:effectRef idx="2">
+            <a:schemeClr val="accent2"/>
+          </a:effectRef>
+          <a:fontRef idx="minor">
+            <a:schemeClr val="lt1"/>
+          </a:fontRef>
+        </p:style>
+        <p:txBody>
+          <a:bodyPr rot="0" spcFirstLastPara="0" vertOverflow="overflow" horzOverflow="overflow" vert="horz" wrap="square" lIns="182880" tIns="146304" rIns="182880" bIns="146304" numCol="1" spcCol="0" rtlCol="0" fromWordArt="0" anchor="t" anchorCtr="0" forceAA="0" compatLnSpc="1">
+            <a:prstTxWarp prst="textNoShape">
+              <a:avLst/>
+            </a:prstTxWarp>
+            <a:noAutofit/>
+          </a:bodyPr>
+          <a:lstStyle/>
+          <a:p>
+            <a:pPr algn="ctr" defTabSz="932472" fontAlgn="base">
+              <a:lnSpc>
+                <a:spcPct val="90000"/>
+              </a:lnSpc>
+              <a:spcBef>
+                <a:spcPct val="0"/>
+              </a:spcBef>
+              <a:spcAft>
+                <a:spcPct val="0"/>
+              </a:spcAft>
+            </a:pPr>
+            <a:endParaRPr lang="en-US" sz="2400" err="1">
+              <a:gradFill>
+                <a:gsLst>
+                  <a:gs pos="0">
+                    <a:srgbClr val="FFFFFF"/>
+                  </a:gs>
+                  <a:gs pos="100000">
+                    <a:srgbClr val="FFFFFF"/>
+                  </a:gs>
+                </a:gsLst>
+                <a:lin ang="5400000" scaled="0"/>
+              </a:gradFill>
+              <a:ea typeface="Segoe UI" pitchFamily="34" charset="0"/>
+              <a:cs typeface="Segoe UI" pitchFamily="34" charset="0"/>
+            </a:endParaRPr>
+          </a:p>
+        </p:txBody>
+      </p:sp>
+    </p:spTree>
+    <p:extLst>
+      <p:ext uri="{BB962C8B-B14F-4D97-AF65-F5344CB8AC3E}">
+        <p14:creationId xmlns:p14="http://schemas.microsoft.com/office/powerpoint/2010/main" val="842576290"/>
+      </p:ext>
+    </p:extLst>
+  </p:cSld>
+  <p:clrMapOvr>
+    <a:masterClrMapping/>
+  </p:clrMapOvr>
+  <p:transition>
+    <p:fade/>
+  </p:transition>
+</p:sld>
+</file>
+
+<file path=ppt/slides/slide6.xml><?xml version="1.0" encoding="utf-8"?>
+<p:sld xmlns:a="http://schemas.openxmlformats.org/drawingml/2006/main" xmlns:r="http://schemas.openxmlformats.org/officeDocument/2006/relationships" xmlns:p="http://schemas.openxmlformats.org/presentationml/2006/main">
+  <p:cSld>
+    <p:spTree>
+      <p:nvGrpSpPr>
+        <p:cNvPr id="1" name=""/>
+        <p:cNvGrpSpPr/>
+        <p:nvPr/>
+      </p:nvGrpSpPr>
+      <p:grpSpPr>
+        <a:xfrm>
+          <a:off x="0" y="0"/>
+          <a:ext cx="0" cy="0"/>
+          <a:chOff x="0" y="0"/>
+          <a:chExt cx="0" cy="0"/>
+        </a:xfrm>
+      </p:grpSpPr>
+      <p:sp>
+        <p:nvSpPr>
+          <p:cNvPr id="2" name="Title 1">
+            <a:extLst>
+              <a:ext uri="{FF2B5EF4-FFF2-40B4-BE49-F238E27FC236}">
+                <a16:creationId xmlns:a16="http://schemas.microsoft.com/office/drawing/2014/main" id="{E5BBB390-B73E-4812-940C-A2213C93E2DC}"/>
+              </a:ext>
+            </a:extLst>
+          </p:cNvPr>
+          <p:cNvSpPr>
+            <a:spLocks noGrp="1"/>
+          </p:cNvSpPr>
+          <p:nvPr>
+            <p:ph type="title"/>
+          </p:nvPr>
+        </p:nvSpPr>
+        <p:spPr>
+          <a:xfrm>
+            <a:off x="455995" y="620428"/>
+            <a:ext cx="11306469" cy="397545"/>
+          </a:xfrm>
+        </p:spPr>
+        <p:txBody>
+          <a:bodyPr/>
+          <a:lstStyle/>
+          <a:p>
+            <a:r>
+              <a:rPr lang="en-US" dirty="0">
+                <a:solidFill>
+                  <a:schemeClr val="accent2">
+                    <a:lumMod val="60000"/>
+                    <a:lumOff val="40000"/>
+                  </a:schemeClr>
+                </a:solidFill>
+                <a:cs typeface="Segoe UI Semibold"/>
+              </a:rPr>
+              <a:t>Why TypeScript?</a:t>
+            </a:r>
+            <a:endParaRPr lang="en-US" dirty="0">
+              <a:solidFill>
+                <a:schemeClr val="accent2">
+                  <a:lumMod val="60000"/>
+                  <a:lumOff val="40000"/>
+                </a:schemeClr>
+              </a:solidFill>
+            </a:endParaRPr>
+          </a:p>
+        </p:txBody>
+      </p:sp>
+      <p:sp>
+        <p:nvSpPr>
+          <p:cNvPr id="3" name="Text Placeholder 2">
+            <a:extLst>
+              <a:ext uri="{FF2B5EF4-FFF2-40B4-BE49-F238E27FC236}">
+                <a16:creationId xmlns:a16="http://schemas.microsoft.com/office/drawing/2014/main" id="{AC3E1E3F-8E9B-4AA3-AFD9-4D7278053F9A}"/>
+              </a:ext>
+            </a:extLst>
+          </p:cNvPr>
+          <p:cNvSpPr>
+            <a:spLocks noGrp="1"/>
+          </p:cNvSpPr>
+          <p:nvPr>
+            <p:ph type="body" sz="quarter" idx="10"/>
+          </p:nvPr>
+        </p:nvSpPr>
+        <p:spPr>
+          <a:xfrm>
+            <a:off x="455995" y="1922586"/>
+            <a:ext cx="9384447" cy="1200329"/>
+          </a:xfrm>
+        </p:spPr>
+        <p:txBody>
+          <a:bodyPr vert="horz" wrap="square" lIns="0" tIns="0" rIns="0" bIns="0" rtlCol="0" anchor="t">
+            <a:spAutoFit/>
+          </a:bodyPr>
+          <a:lstStyle/>
+          <a:p>
+            <a:pPr marL="280035" indent="-280035">
+              <a:lnSpc>
+                <a:spcPct val="150000"/>
+              </a:lnSpc>
+              <a:spcAft>
+                <a:spcPts val="588"/>
+              </a:spcAft>
+              <a:buFont typeface="Arial,Sans-Serif" panose="020B0604020202020204" pitchFamily="34" charset="0"/>
+            </a:pPr>
+            <a:endParaRPr lang="en-US">
+              <a:ea typeface="+mn-lt"/>
+              <a:cs typeface="+mn-lt"/>
+            </a:endParaRPr>
+          </a:p>
+          <a:p>
+            <a:pPr marL="280035" indent="-280035">
+              <a:lnSpc>
+                <a:spcPct val="90000"/>
+              </a:lnSpc>
+              <a:spcAft>
+                <a:spcPts val="588"/>
+              </a:spcAft>
+              <a:buFont typeface="Arial,Sans-Serif" panose="020B0604020202020204" pitchFamily="34" charset="0"/>
+              <a:buChar char="•"/>
+            </a:pPr>
+            <a:endParaRPr lang="en-US">
+              <a:ea typeface="+mn-lt"/>
+              <a:cs typeface="+mn-lt"/>
+            </a:endParaRPr>
+          </a:p>
+          <a:p>
+            <a:pPr marL="335915" indent="-335915"/>
+            <a:endParaRPr lang="en-US">
+              <a:ea typeface="+mn-lt"/>
+              <a:cs typeface="+mn-lt"/>
+            </a:endParaRPr>
+          </a:p>
+        </p:txBody>
+      </p:sp>
+      <p:sp>
+        <p:nvSpPr>
+          <p:cNvPr id="4" name="TextBox 3">
+            <a:extLst>
+              <a:ext uri="{FF2B5EF4-FFF2-40B4-BE49-F238E27FC236}">
+                <a16:creationId xmlns:a16="http://schemas.microsoft.com/office/drawing/2014/main" id="{40C999F7-4F4C-403D-A55C-E359CFC56B8B}"/>
+              </a:ext>
+            </a:extLst>
+          </p:cNvPr>
+          <p:cNvSpPr txBox="1"/>
+          <p:nvPr/>
+        </p:nvSpPr>
+        <p:spPr>
+          <a:xfrm>
+            <a:off x="1055411" y="1469630"/>
+            <a:ext cx="10081178" cy="1095685"/>
+          </a:xfrm>
+          <a:prstGeom prst="rect">
+            <a:avLst/>
+          </a:prstGeom>
+          <a:noFill/>
+        </p:spPr>
+        <p:txBody>
+          <a:bodyPr rot="0" spcFirstLastPara="0" vertOverflow="overflow" horzOverflow="overflow" vert="horz" wrap="square" lIns="182880" tIns="146304" rIns="182880" bIns="146304" numCol="1" spcCol="0" rtlCol="0" fromWordArt="0" anchor="t" anchorCtr="0" forceAA="0" compatLnSpc="1">
+            <a:prstTxWarp prst="textNoShape">
+              <a:avLst/>
+            </a:prstTxWarp>
+            <a:spAutoFit/>
+          </a:bodyPr>
+          <a:lstStyle/>
+          <a:p>
+            <a:pPr marL="457200" indent="-457200">
+              <a:buFont typeface="Arial" panose="020B0604020202020204" pitchFamily="34" charset="0"/>
+              <a:buChar char="•"/>
+            </a:pPr>
+            <a:r>
+              <a:rPr lang="en-US" sz="2800" b="0" dirty="0">
+                <a:solidFill>
+                  <a:srgbClr val="000000"/>
+                </a:solidFill>
+                <a:effectLst/>
+              </a:rPr>
+              <a:t>x</a:t>
+            </a:r>
+          </a:p>
+          <a:p>
+            <a:endParaRPr lang="en-US" sz="2400" dirty="0">
+              <a:cs typeface="Segoe UI"/>
+            </a:endParaRPr>
+          </a:p>
+        </p:txBody>
+      </p:sp>
+      <p:sp>
+        <p:nvSpPr>
+          <p:cNvPr id="9" name="Rectangle 8">
+            <a:extLst>
+              <a:ext uri="{FF2B5EF4-FFF2-40B4-BE49-F238E27FC236}">
+                <a16:creationId xmlns:a16="http://schemas.microsoft.com/office/drawing/2014/main" id="{E3743541-CC54-4122-901F-31E4C928C0B5}"/>
+              </a:ext>
+            </a:extLst>
+          </p:cNvPr>
+          <p:cNvSpPr/>
+          <p:nvPr/>
+        </p:nvSpPr>
+        <p:spPr bwMode="auto">
+          <a:xfrm>
+            <a:off x="5667829" y="968829"/>
+            <a:ext cx="914400" cy="152400"/>
+          </a:xfrm>
+          <a:prstGeom prst="rect">
+            <a:avLst/>
+          </a:prstGeom>
+          <a:solidFill>
+            <a:schemeClr val="bg1"/>
+          </a:solidFill>
+          <a:ln>
+            <a:noFill/>
+            <a:headEnd type="none" w="med" len="med"/>
+            <a:tailEnd type="none" w="med" len="med"/>
+          </a:ln>
+          <a:effectLst/>
+        </p:spPr>
+        <p:style>
+          <a:lnRef idx="1">
+            <a:schemeClr val="accent2"/>
+          </a:lnRef>
+          <a:fillRef idx="3">
+            <a:schemeClr val="accent2"/>
+          </a:fillRef>
+          <a:effectRef idx="2">
+            <a:schemeClr val="accent2"/>
+          </a:effectRef>
+          <a:fontRef idx="minor">
+            <a:schemeClr val="lt1"/>
+          </a:fontRef>
+        </p:style>
+        <p:txBody>
+          <a:bodyPr rot="0" spcFirstLastPara="0" vertOverflow="overflow" horzOverflow="overflow" vert="horz" wrap="square" lIns="182880" tIns="146304" rIns="182880" bIns="146304" numCol="1" spcCol="0" rtlCol="0" fromWordArt="0" anchor="t" anchorCtr="0" forceAA="0" compatLnSpc="1">
+            <a:prstTxWarp prst="textNoShape">
+              <a:avLst/>
+            </a:prstTxWarp>
+            <a:noAutofit/>
+          </a:bodyPr>
+          <a:lstStyle/>
+          <a:p>
+            <a:pPr algn="ctr" defTabSz="932472" fontAlgn="base">
+              <a:lnSpc>
+                <a:spcPct val="90000"/>
+              </a:lnSpc>
+              <a:spcBef>
+                <a:spcPct val="0"/>
+              </a:spcBef>
+              <a:spcAft>
+                <a:spcPct val="0"/>
+              </a:spcAft>
+            </a:pPr>
+            <a:endParaRPr lang="en-US" sz="2400" err="1">
+              <a:gradFill>
+                <a:gsLst>
+                  <a:gs pos="0">
+                    <a:srgbClr val="FFFFFF"/>
+                  </a:gs>
+                  <a:gs pos="100000">
+                    <a:srgbClr val="FFFFFF"/>
+                  </a:gs>
+                </a:gsLst>
+                <a:lin ang="5400000" scaled="0"/>
+              </a:gradFill>
+              <a:ea typeface="Segoe UI" pitchFamily="34" charset="0"/>
+              <a:cs typeface="Segoe UI" pitchFamily="34" charset="0"/>
+            </a:endParaRPr>
+          </a:p>
+        </p:txBody>
+      </p:sp>
+      <p:sp>
+        <p:nvSpPr>
+          <p:cNvPr id="25" name="Rectangle 24">
+            <a:extLst>
+              <a:ext uri="{FF2B5EF4-FFF2-40B4-BE49-F238E27FC236}">
+                <a16:creationId xmlns:a16="http://schemas.microsoft.com/office/drawing/2014/main" id="{34DBF81F-4274-4E2A-AAB7-489C7A6E6394}"/>
+              </a:ext>
+            </a:extLst>
+          </p:cNvPr>
+          <p:cNvSpPr/>
+          <p:nvPr/>
+        </p:nvSpPr>
+        <p:spPr bwMode="auto">
+          <a:xfrm>
+            <a:off x="11442970" y="1188395"/>
+            <a:ext cx="249676" cy="71336"/>
+          </a:xfrm>
+          <a:prstGeom prst="rect">
+            <a:avLst/>
+          </a:prstGeom>
+          <a:solidFill>
+            <a:schemeClr val="bg1"/>
+          </a:solidFill>
+          <a:ln>
+            <a:noFill/>
+            <a:headEnd type="none" w="med" len="med"/>
+            <a:tailEnd type="none" w="med" len="med"/>
+          </a:ln>
+          <a:effectLst/>
+        </p:spPr>
+        <p:style>
+          <a:lnRef idx="1">
+            <a:schemeClr val="accent2"/>
+          </a:lnRef>
+          <a:fillRef idx="3">
+            <a:schemeClr val="accent2"/>
+          </a:fillRef>
+          <a:effectRef idx="2">
+            <a:schemeClr val="accent2"/>
+          </a:effectRef>
+          <a:fontRef idx="minor">
+            <a:schemeClr val="lt1"/>
+          </a:fontRef>
+        </p:style>
+        <p:txBody>
+          <a:bodyPr rot="0" spcFirstLastPara="0" vertOverflow="overflow" horzOverflow="overflow" vert="horz" wrap="square" lIns="182880" tIns="146304" rIns="182880" bIns="146304" numCol="1" spcCol="0" rtlCol="0" fromWordArt="0" anchor="t" anchorCtr="0" forceAA="0" compatLnSpc="1">
+            <a:prstTxWarp prst="textNoShape">
+              <a:avLst/>
+            </a:prstTxWarp>
+            <a:noAutofit/>
+          </a:bodyPr>
+          <a:lstStyle/>
+          <a:p>
+            <a:pPr algn="ctr" defTabSz="932472" fontAlgn="base">
+              <a:lnSpc>
+                <a:spcPct val="90000"/>
+              </a:lnSpc>
+              <a:spcBef>
+                <a:spcPct val="0"/>
+              </a:spcBef>
+              <a:spcAft>
+                <a:spcPct val="0"/>
+              </a:spcAft>
+            </a:pPr>
+            <a:endParaRPr lang="en-US" sz="2400" err="1">
+              <a:gradFill>
+                <a:gsLst>
+                  <a:gs pos="0">
+                    <a:srgbClr val="FFFFFF"/>
+                  </a:gs>
+                  <a:gs pos="100000">
+                    <a:srgbClr val="FFFFFF"/>
+                  </a:gs>
+                </a:gsLst>
+                <a:lin ang="5400000" scaled="0"/>
+              </a:gradFill>
+              <a:ea typeface="Segoe UI" pitchFamily="34" charset="0"/>
+              <a:cs typeface="Segoe UI" pitchFamily="34" charset="0"/>
+            </a:endParaRPr>
+          </a:p>
+        </p:txBody>
+      </p:sp>
+      <p:sp>
+        <p:nvSpPr>
+          <p:cNvPr id="26" name="Rectangle 25">
+            <a:extLst>
+              <a:ext uri="{FF2B5EF4-FFF2-40B4-BE49-F238E27FC236}">
+                <a16:creationId xmlns:a16="http://schemas.microsoft.com/office/drawing/2014/main" id="{9B6E6037-C806-4A4B-A60D-ABC4892E98B9}"/>
+              </a:ext>
+            </a:extLst>
+          </p:cNvPr>
+          <p:cNvSpPr/>
+          <p:nvPr/>
+        </p:nvSpPr>
+        <p:spPr bwMode="auto">
+          <a:xfrm>
+            <a:off x="11370012" y="1139756"/>
+            <a:ext cx="249676" cy="71336"/>
+          </a:xfrm>
+          <a:prstGeom prst="rect">
+            <a:avLst/>
+          </a:prstGeom>
+          <a:solidFill>
+            <a:schemeClr val="bg1"/>
+          </a:solidFill>
+          <a:ln>
+            <a:noFill/>
+            <a:headEnd type="none" w="med" len="med"/>
+            <a:tailEnd type="none" w="med" len="med"/>
+          </a:ln>
+          <a:effectLst/>
+        </p:spPr>
+        <p:style>
+          <a:lnRef idx="1">
+            <a:schemeClr val="accent2"/>
+          </a:lnRef>
+          <a:fillRef idx="3">
+            <a:schemeClr val="accent2"/>
+          </a:fillRef>
+          <a:effectRef idx="2">
+            <a:schemeClr val="accent2"/>
+          </a:effectRef>
+          <a:fontRef idx="minor">
+            <a:schemeClr val="lt1"/>
+          </a:fontRef>
+        </p:style>
+        <p:txBody>
+          <a:bodyPr rot="0" spcFirstLastPara="0" vertOverflow="overflow" horzOverflow="overflow" vert="horz" wrap="square" lIns="182880" tIns="146304" rIns="182880" bIns="146304" numCol="1" spcCol="0" rtlCol="0" fromWordArt="0" anchor="t" anchorCtr="0" forceAA="0" compatLnSpc="1">
+            <a:prstTxWarp prst="textNoShape">
+              <a:avLst/>
+            </a:prstTxWarp>
+            <a:noAutofit/>
+          </a:bodyPr>
+          <a:lstStyle/>
+          <a:p>
+            <a:pPr algn="ctr" defTabSz="932472" fontAlgn="base">
+              <a:lnSpc>
+                <a:spcPct val="90000"/>
+              </a:lnSpc>
+              <a:spcBef>
+                <a:spcPct val="0"/>
+              </a:spcBef>
+              <a:spcAft>
+                <a:spcPct val="0"/>
+              </a:spcAft>
+            </a:pPr>
+            <a:endParaRPr lang="en-US" sz="2400" err="1">
+              <a:gradFill>
+                <a:gsLst>
+                  <a:gs pos="0">
+                    <a:srgbClr val="FFFFFF"/>
+                  </a:gs>
+                  <a:gs pos="100000">
+                    <a:srgbClr val="FFFFFF"/>
+                  </a:gs>
+                </a:gsLst>
+                <a:lin ang="5400000" scaled="0"/>
+              </a:gradFill>
+              <a:ea typeface="Segoe UI" pitchFamily="34" charset="0"/>
+              <a:cs typeface="Segoe UI" pitchFamily="34" charset="0"/>
+            </a:endParaRPr>
+          </a:p>
+        </p:txBody>
+      </p:sp>
+    </p:spTree>
+    <p:extLst>
+      <p:ext uri="{BB962C8B-B14F-4D97-AF65-F5344CB8AC3E}">
+        <p14:creationId xmlns:p14="http://schemas.microsoft.com/office/powerpoint/2010/main" val="286692460"/>
+      </p:ext>
+    </p:extLst>
+  </p:cSld>
+  <p:clrMapOvr>
+    <a:masterClrMapping/>
+  </p:clrMapOvr>
+  <p:transition>
+    <p:fade/>
+  </p:transition>
+</p:sld>
+</file>
+
+<file path=ppt/slides/slide7.xml><?xml version="1.0" encoding="utf-8"?>
+<p:sld xmlns:a="http://schemas.openxmlformats.org/drawingml/2006/main" xmlns:r="http://schemas.openxmlformats.org/officeDocument/2006/relationships" xmlns:p="http://schemas.openxmlformats.org/presentationml/2006/main">
+  <p:cSld>
+    <p:spTree>
+      <p:nvGrpSpPr>
+        <p:cNvPr id="1" name=""/>
+        <p:cNvGrpSpPr/>
+        <p:nvPr/>
+      </p:nvGrpSpPr>
+      <p:grpSpPr>
+        <a:xfrm>
+          <a:off x="0" y="0"/>
+          <a:ext cx="0" cy="0"/>
+          <a:chOff x="0" y="0"/>
+          <a:chExt cx="0" cy="0"/>
+        </a:xfrm>
+      </p:grpSpPr>
+      <p:sp>
+        <p:nvSpPr>
+          <p:cNvPr id="2" name="Title 1">
+            <a:extLst>
+              <a:ext uri="{FF2B5EF4-FFF2-40B4-BE49-F238E27FC236}">
+                <a16:creationId xmlns:a16="http://schemas.microsoft.com/office/drawing/2014/main" id="{E5BBB390-B73E-4812-940C-A2213C93E2DC}"/>
+              </a:ext>
+            </a:extLst>
+          </p:cNvPr>
+          <p:cNvSpPr>
+            <a:spLocks noGrp="1"/>
+          </p:cNvSpPr>
+          <p:nvPr>
+            <p:ph type="title"/>
+          </p:nvPr>
+        </p:nvSpPr>
+        <p:spPr>
+          <a:xfrm>
+            <a:off x="455995" y="620428"/>
+            <a:ext cx="11306469" cy="397545"/>
+          </a:xfrm>
+        </p:spPr>
+        <p:txBody>
+          <a:bodyPr/>
+          <a:lstStyle/>
+          <a:p>
+            <a:r>
+              <a:rPr lang="en-US" dirty="0">
+                <a:solidFill>
+                  <a:schemeClr val="accent2">
+                    <a:lumMod val="60000"/>
+                    <a:lumOff val="40000"/>
+                  </a:schemeClr>
+                </a:solidFill>
+                <a:cs typeface="Segoe UI Semibold"/>
+              </a:rPr>
+              <a:t>The </a:t>
+            </a:r>
+            <a:r>
+              <a:rPr lang="en-US" dirty="0" err="1">
+                <a:solidFill>
+                  <a:schemeClr val="accent2">
+                    <a:lumMod val="60000"/>
+                    <a:lumOff val="40000"/>
+                  </a:schemeClr>
+                </a:solidFill>
+                <a:cs typeface="Segoe UI Semibold"/>
+              </a:rPr>
+              <a:t>azu-js</a:t>
+            </a:r>
+            <a:r>
+              <a:rPr lang="en-US" dirty="0">
+                <a:solidFill>
+                  <a:schemeClr val="accent2">
+                    <a:lumMod val="60000"/>
+                    <a:lumOff val="40000"/>
+                  </a:schemeClr>
+                </a:solidFill>
+                <a:cs typeface="Segoe UI Semibold"/>
+              </a:rPr>
+              <a:t> Package @ NPM</a:t>
+            </a:r>
+            <a:endParaRPr lang="en-US" dirty="0">
+              <a:solidFill>
+                <a:schemeClr val="accent2">
+                  <a:lumMod val="60000"/>
+                  <a:lumOff val="40000"/>
+                </a:schemeClr>
+              </a:solidFill>
+            </a:endParaRPr>
+          </a:p>
+        </p:txBody>
+      </p:sp>
+      <p:sp>
+        <p:nvSpPr>
+          <p:cNvPr id="3" name="Text Placeholder 2">
+            <a:extLst>
+              <a:ext uri="{FF2B5EF4-FFF2-40B4-BE49-F238E27FC236}">
+                <a16:creationId xmlns:a16="http://schemas.microsoft.com/office/drawing/2014/main" id="{AC3E1E3F-8E9B-4AA3-AFD9-4D7278053F9A}"/>
+              </a:ext>
+            </a:extLst>
+          </p:cNvPr>
+          <p:cNvSpPr>
+            <a:spLocks noGrp="1"/>
+          </p:cNvSpPr>
+          <p:nvPr>
+            <p:ph type="body" sz="quarter" idx="10"/>
+          </p:nvPr>
+        </p:nvSpPr>
+        <p:spPr>
+          <a:xfrm>
+            <a:off x="455995" y="1922586"/>
+            <a:ext cx="9384447" cy="1200329"/>
+          </a:xfrm>
+        </p:spPr>
+        <p:txBody>
+          <a:bodyPr vert="horz" wrap="square" lIns="0" tIns="0" rIns="0" bIns="0" rtlCol="0" anchor="t">
+            <a:spAutoFit/>
+          </a:bodyPr>
+          <a:lstStyle/>
+          <a:p>
+            <a:pPr marL="280035" indent="-280035">
+              <a:lnSpc>
+                <a:spcPct val="150000"/>
+              </a:lnSpc>
+              <a:spcAft>
+                <a:spcPts val="588"/>
+              </a:spcAft>
+              <a:buFont typeface="Arial,Sans-Serif" panose="020B0604020202020204" pitchFamily="34" charset="0"/>
+            </a:pPr>
+            <a:endParaRPr lang="en-US">
+              <a:ea typeface="+mn-lt"/>
+              <a:cs typeface="+mn-lt"/>
+            </a:endParaRPr>
+          </a:p>
+          <a:p>
+            <a:pPr marL="280035" indent="-280035">
+              <a:lnSpc>
+                <a:spcPct val="90000"/>
+              </a:lnSpc>
+              <a:spcAft>
+                <a:spcPts val="588"/>
+              </a:spcAft>
+              <a:buFont typeface="Arial,Sans-Serif" panose="020B0604020202020204" pitchFamily="34" charset="0"/>
+              <a:buChar char="•"/>
+            </a:pPr>
+            <a:endParaRPr lang="en-US">
+              <a:ea typeface="+mn-lt"/>
+              <a:cs typeface="+mn-lt"/>
+            </a:endParaRPr>
+          </a:p>
+          <a:p>
+            <a:pPr marL="335915" indent="-335915"/>
+            <a:endParaRPr lang="en-US">
+              <a:ea typeface="+mn-lt"/>
+              <a:cs typeface="+mn-lt"/>
+            </a:endParaRPr>
+          </a:p>
+        </p:txBody>
+      </p:sp>
+      <p:sp>
+        <p:nvSpPr>
+          <p:cNvPr id="4" name="TextBox 3">
+            <a:extLst>
+              <a:ext uri="{FF2B5EF4-FFF2-40B4-BE49-F238E27FC236}">
+                <a16:creationId xmlns:a16="http://schemas.microsoft.com/office/drawing/2014/main" id="{40C999F7-4F4C-403D-A55C-E359CFC56B8B}"/>
+              </a:ext>
+            </a:extLst>
+          </p:cNvPr>
+          <p:cNvSpPr txBox="1"/>
+          <p:nvPr/>
+        </p:nvSpPr>
+        <p:spPr>
+          <a:xfrm>
+            <a:off x="1055411" y="1469630"/>
+            <a:ext cx="10081178" cy="1095685"/>
+          </a:xfrm>
+          <a:prstGeom prst="rect">
+            <a:avLst/>
+          </a:prstGeom>
+          <a:noFill/>
+        </p:spPr>
+        <p:txBody>
+          <a:bodyPr rot="0" spcFirstLastPara="0" vertOverflow="overflow" horzOverflow="overflow" vert="horz" wrap="square" lIns="182880" tIns="146304" rIns="182880" bIns="146304" numCol="1" spcCol="0" rtlCol="0" fromWordArt="0" anchor="t" anchorCtr="0" forceAA="0" compatLnSpc="1">
+            <a:prstTxWarp prst="textNoShape">
+              <a:avLst/>
+            </a:prstTxWarp>
+            <a:spAutoFit/>
+          </a:bodyPr>
+          <a:lstStyle/>
+          <a:p>
+            <a:pPr marL="457200" indent="-457200">
+              <a:buFont typeface="Arial" panose="020B0604020202020204" pitchFamily="34" charset="0"/>
+              <a:buChar char="•"/>
+            </a:pPr>
+            <a:r>
+              <a:rPr lang="en-US" sz="2800" b="0" dirty="0">
+                <a:solidFill>
+                  <a:srgbClr val="000000"/>
+                </a:solidFill>
+                <a:effectLst/>
+              </a:rPr>
+              <a:t>x</a:t>
+            </a:r>
+          </a:p>
+          <a:p>
+            <a:endParaRPr lang="en-US" sz="2400" dirty="0">
+              <a:cs typeface="Segoe UI"/>
+            </a:endParaRPr>
+          </a:p>
+        </p:txBody>
+      </p:sp>
+      <p:sp>
+        <p:nvSpPr>
+          <p:cNvPr id="9" name="Rectangle 8">
+            <a:extLst>
+              <a:ext uri="{FF2B5EF4-FFF2-40B4-BE49-F238E27FC236}">
+                <a16:creationId xmlns:a16="http://schemas.microsoft.com/office/drawing/2014/main" id="{E3743541-CC54-4122-901F-31E4C928C0B5}"/>
+              </a:ext>
+            </a:extLst>
+          </p:cNvPr>
+          <p:cNvSpPr/>
+          <p:nvPr/>
+        </p:nvSpPr>
+        <p:spPr bwMode="auto">
+          <a:xfrm>
+            <a:off x="5667829" y="968829"/>
+            <a:ext cx="914400" cy="152400"/>
+          </a:xfrm>
+          <a:prstGeom prst="rect">
+            <a:avLst/>
+          </a:prstGeom>
+          <a:solidFill>
+            <a:schemeClr val="bg1"/>
+          </a:solidFill>
+          <a:ln>
+            <a:noFill/>
+            <a:headEnd type="none" w="med" len="med"/>
+            <a:tailEnd type="none" w="med" len="med"/>
+          </a:ln>
+          <a:effectLst/>
+        </p:spPr>
+        <p:style>
+          <a:lnRef idx="1">
+            <a:schemeClr val="accent2"/>
+          </a:lnRef>
+          <a:fillRef idx="3">
+            <a:schemeClr val="accent2"/>
+          </a:fillRef>
+          <a:effectRef idx="2">
+            <a:schemeClr val="accent2"/>
+          </a:effectRef>
+          <a:fontRef idx="minor">
+            <a:schemeClr val="lt1"/>
+          </a:fontRef>
+        </p:style>
+        <p:txBody>
+          <a:bodyPr rot="0" spcFirstLastPara="0" vertOverflow="overflow" horzOverflow="overflow" vert="horz" wrap="square" lIns="182880" tIns="146304" rIns="182880" bIns="146304" numCol="1" spcCol="0" rtlCol="0" fromWordArt="0" anchor="t" anchorCtr="0" forceAA="0" compatLnSpc="1">
+            <a:prstTxWarp prst="textNoShape">
+              <a:avLst/>
+            </a:prstTxWarp>
+            <a:noAutofit/>
+          </a:bodyPr>
+          <a:lstStyle/>
+          <a:p>
+            <a:pPr algn="ctr" defTabSz="932472" fontAlgn="base">
+              <a:lnSpc>
+                <a:spcPct val="90000"/>
+              </a:lnSpc>
+              <a:spcBef>
+                <a:spcPct val="0"/>
+              </a:spcBef>
+              <a:spcAft>
+                <a:spcPct val="0"/>
+              </a:spcAft>
+            </a:pPr>
+            <a:endParaRPr lang="en-US" sz="2400" err="1">
+              <a:gradFill>
+                <a:gsLst>
+                  <a:gs pos="0">
+                    <a:srgbClr val="FFFFFF"/>
+                  </a:gs>
+                  <a:gs pos="100000">
+                    <a:srgbClr val="FFFFFF"/>
+                  </a:gs>
+                </a:gsLst>
+                <a:lin ang="5400000" scaled="0"/>
+              </a:gradFill>
+              <a:ea typeface="Segoe UI" pitchFamily="34" charset="0"/>
+              <a:cs typeface="Segoe UI" pitchFamily="34" charset="0"/>
+            </a:endParaRPr>
+          </a:p>
+        </p:txBody>
+      </p:sp>
+      <p:sp>
+        <p:nvSpPr>
+          <p:cNvPr id="25" name="Rectangle 24">
+            <a:extLst>
+              <a:ext uri="{FF2B5EF4-FFF2-40B4-BE49-F238E27FC236}">
+                <a16:creationId xmlns:a16="http://schemas.microsoft.com/office/drawing/2014/main" id="{34DBF81F-4274-4E2A-AAB7-489C7A6E6394}"/>
+              </a:ext>
+            </a:extLst>
+          </p:cNvPr>
+          <p:cNvSpPr/>
+          <p:nvPr/>
+        </p:nvSpPr>
+        <p:spPr bwMode="auto">
+          <a:xfrm>
+            <a:off x="11442970" y="1188395"/>
+            <a:ext cx="249676" cy="71336"/>
+          </a:xfrm>
+          <a:prstGeom prst="rect">
+            <a:avLst/>
+          </a:prstGeom>
+          <a:solidFill>
+            <a:schemeClr val="bg1"/>
+          </a:solidFill>
+          <a:ln>
+            <a:noFill/>
+            <a:headEnd type="none" w="med" len="med"/>
+            <a:tailEnd type="none" w="med" len="med"/>
+          </a:ln>
+          <a:effectLst/>
+        </p:spPr>
+        <p:style>
+          <a:lnRef idx="1">
+            <a:schemeClr val="accent2"/>
+          </a:lnRef>
+          <a:fillRef idx="3">
+            <a:schemeClr val="accent2"/>
+          </a:fillRef>
+          <a:effectRef idx="2">
+            <a:schemeClr val="accent2"/>
+          </a:effectRef>
+          <a:fontRef idx="minor">
+            <a:schemeClr val="lt1"/>
+          </a:fontRef>
+        </p:style>
+        <p:txBody>
+          <a:bodyPr rot="0" spcFirstLastPara="0" vertOverflow="overflow" horzOverflow="overflow" vert="horz" wrap="square" lIns="182880" tIns="146304" rIns="182880" bIns="146304" numCol="1" spcCol="0" rtlCol="0" fromWordArt="0" anchor="t" anchorCtr="0" forceAA="0" compatLnSpc="1">
+            <a:prstTxWarp prst="textNoShape">
+              <a:avLst/>
+            </a:prstTxWarp>
+            <a:noAutofit/>
+          </a:bodyPr>
+          <a:lstStyle/>
+          <a:p>
+            <a:pPr algn="ctr" defTabSz="932472" fontAlgn="base">
+              <a:lnSpc>
+                <a:spcPct val="90000"/>
+              </a:lnSpc>
+              <a:spcBef>
+                <a:spcPct val="0"/>
+              </a:spcBef>
+              <a:spcAft>
+                <a:spcPct val="0"/>
+              </a:spcAft>
+            </a:pPr>
+            <a:endParaRPr lang="en-US" sz="2400" err="1">
+              <a:gradFill>
+                <a:gsLst>
+                  <a:gs pos="0">
+                    <a:srgbClr val="FFFFFF"/>
+                  </a:gs>
+                  <a:gs pos="100000">
+                    <a:srgbClr val="FFFFFF"/>
+                  </a:gs>
+                </a:gsLst>
+                <a:lin ang="5400000" scaled="0"/>
+              </a:gradFill>
+              <a:ea typeface="Segoe UI" pitchFamily="34" charset="0"/>
+              <a:cs typeface="Segoe UI" pitchFamily="34" charset="0"/>
+            </a:endParaRPr>
+          </a:p>
+        </p:txBody>
+      </p:sp>
+      <p:sp>
+        <p:nvSpPr>
+          <p:cNvPr id="26" name="Rectangle 25">
+            <a:extLst>
+              <a:ext uri="{FF2B5EF4-FFF2-40B4-BE49-F238E27FC236}">
+                <a16:creationId xmlns:a16="http://schemas.microsoft.com/office/drawing/2014/main" id="{9B6E6037-C806-4A4B-A60D-ABC4892E98B9}"/>
+              </a:ext>
+            </a:extLst>
+          </p:cNvPr>
+          <p:cNvSpPr/>
+          <p:nvPr/>
+        </p:nvSpPr>
+        <p:spPr bwMode="auto">
+          <a:xfrm>
+            <a:off x="11370012" y="1139756"/>
+            <a:ext cx="249676" cy="71336"/>
+          </a:xfrm>
+          <a:prstGeom prst="rect">
+            <a:avLst/>
+          </a:prstGeom>
+          <a:solidFill>
+            <a:schemeClr val="bg1"/>
+          </a:solidFill>
+          <a:ln>
+            <a:noFill/>
+            <a:headEnd type="none" w="med" len="med"/>
+            <a:tailEnd type="none" w="med" len="med"/>
+          </a:ln>
+          <a:effectLst/>
+        </p:spPr>
+        <p:style>
+          <a:lnRef idx="1">
+            <a:schemeClr val="accent2"/>
+          </a:lnRef>
+          <a:fillRef idx="3">
+            <a:schemeClr val="accent2"/>
+          </a:fillRef>
+          <a:effectRef idx="2">
+            <a:schemeClr val="accent2"/>
+          </a:effectRef>
+          <a:fontRef idx="minor">
+            <a:schemeClr val="lt1"/>
+          </a:fontRef>
+        </p:style>
+        <p:txBody>
+          <a:bodyPr rot="0" spcFirstLastPara="0" vertOverflow="overflow" horzOverflow="overflow" vert="horz" wrap="square" lIns="182880" tIns="146304" rIns="182880" bIns="146304" numCol="1" spcCol="0" rtlCol="0" fromWordArt="0" anchor="t" anchorCtr="0" forceAA="0" compatLnSpc="1">
+            <a:prstTxWarp prst="textNoShape">
+              <a:avLst/>
+            </a:prstTxWarp>
+            <a:noAutofit/>
+          </a:bodyPr>
+          <a:lstStyle/>
+          <a:p>
+            <a:pPr algn="ctr" defTabSz="932472" fontAlgn="base">
+              <a:lnSpc>
+                <a:spcPct val="90000"/>
+              </a:lnSpc>
+              <a:spcBef>
+                <a:spcPct val="0"/>
+              </a:spcBef>
+              <a:spcAft>
+                <a:spcPct val="0"/>
+              </a:spcAft>
+            </a:pPr>
+            <a:endParaRPr lang="en-US" sz="2400" err="1">
+              <a:gradFill>
+                <a:gsLst>
+                  <a:gs pos="0">
+                    <a:srgbClr val="FFFFFF"/>
+                  </a:gs>
+                  <a:gs pos="100000">
+                    <a:srgbClr val="FFFFFF"/>
+                  </a:gs>
+                </a:gsLst>
+                <a:lin ang="5400000" scaled="0"/>
+              </a:gradFill>
+              <a:ea typeface="Segoe UI" pitchFamily="34" charset="0"/>
+              <a:cs typeface="Segoe UI" pitchFamily="34" charset="0"/>
+            </a:endParaRPr>
+          </a:p>
+        </p:txBody>
+      </p:sp>
+    </p:spTree>
+    <p:extLst>
+      <p:ext uri="{BB962C8B-B14F-4D97-AF65-F5344CB8AC3E}">
+        <p14:creationId xmlns:p14="http://schemas.microsoft.com/office/powerpoint/2010/main" val="1683270988"/>
+      </p:ext>
+    </p:extLst>
+  </p:cSld>
+  <p:clrMapOvr>
+    <a:masterClrMapping/>
+  </p:clrMapOvr>
+  <p:transition>
+    <p:fade/>
+  </p:transition>
+</p:sld>
+</file>
+
+<file path=ppt/slides/slide8.xml><?xml version="1.0" encoding="utf-8"?>
+<p:sld xmlns:a="http://schemas.openxmlformats.org/drawingml/2006/main" xmlns:r="http://schemas.openxmlformats.org/officeDocument/2006/relationships" xmlns:p="http://schemas.openxmlformats.org/presentationml/2006/main">
+  <p:cSld>
+    <p:spTree>
+      <p:nvGrpSpPr>
+        <p:cNvPr id="1" name=""/>
+        <p:cNvGrpSpPr/>
+        <p:nvPr/>
+      </p:nvGrpSpPr>
+      <p:grpSpPr>
+        <a:xfrm>
+          <a:off x="0" y="0"/>
+          <a:ext cx="0" cy="0"/>
+          <a:chOff x="0" y="0"/>
+          <a:chExt cx="0" cy="0"/>
+        </a:xfrm>
+      </p:grpSpPr>
+      <p:sp>
+        <p:nvSpPr>
+          <p:cNvPr id="2" name="Title 1">
+            <a:extLst>
+              <a:ext uri="{FF2B5EF4-FFF2-40B4-BE49-F238E27FC236}">
+                <a16:creationId xmlns:a16="http://schemas.microsoft.com/office/drawing/2014/main" id="{E5BBB390-B73E-4812-940C-A2213C93E2DC}"/>
+              </a:ext>
+            </a:extLst>
+          </p:cNvPr>
+          <p:cNvSpPr>
+            <a:spLocks noGrp="1"/>
+          </p:cNvSpPr>
+          <p:nvPr>
+            <p:ph type="title"/>
+          </p:nvPr>
+        </p:nvSpPr>
+        <p:spPr>
+          <a:xfrm>
+            <a:off x="455995" y="620428"/>
+            <a:ext cx="11306469" cy="397545"/>
+          </a:xfrm>
+        </p:spPr>
+        <p:txBody>
+          <a:bodyPr/>
+          <a:lstStyle/>
+          <a:p>
+            <a:r>
+              <a:rPr lang="en-US" dirty="0">
+                <a:solidFill>
+                  <a:schemeClr val="accent2">
+                    <a:lumMod val="60000"/>
+                    <a:lumOff val="40000"/>
+                  </a:schemeClr>
+                </a:solidFill>
+                <a:cs typeface="Segoe UI Semibold"/>
+              </a:rPr>
+              <a:t>The TypeScript/Express/Cosmos DB Web Application : Code</a:t>
+            </a:r>
+            <a:endParaRPr lang="en-US" dirty="0">
+              <a:solidFill>
+                <a:schemeClr val="accent2">
+                  <a:lumMod val="60000"/>
+                  <a:lumOff val="40000"/>
+                </a:schemeClr>
+              </a:solidFill>
+            </a:endParaRPr>
+          </a:p>
+        </p:txBody>
+      </p:sp>
+      <p:sp>
+        <p:nvSpPr>
+          <p:cNvPr id="3" name="Text Placeholder 2">
+            <a:extLst>
+              <a:ext uri="{FF2B5EF4-FFF2-40B4-BE49-F238E27FC236}">
+                <a16:creationId xmlns:a16="http://schemas.microsoft.com/office/drawing/2014/main" id="{AC3E1E3F-8E9B-4AA3-AFD9-4D7278053F9A}"/>
+              </a:ext>
+            </a:extLst>
+          </p:cNvPr>
+          <p:cNvSpPr>
+            <a:spLocks noGrp="1"/>
+          </p:cNvSpPr>
+          <p:nvPr>
+            <p:ph type="body" sz="quarter" idx="10"/>
+          </p:nvPr>
+        </p:nvSpPr>
+        <p:spPr>
+          <a:xfrm>
+            <a:off x="455995" y="1922586"/>
+            <a:ext cx="9384447" cy="1200329"/>
+          </a:xfrm>
+        </p:spPr>
+        <p:txBody>
+          <a:bodyPr vert="horz" wrap="square" lIns="0" tIns="0" rIns="0" bIns="0" rtlCol="0" anchor="t">
+            <a:spAutoFit/>
+          </a:bodyPr>
+          <a:lstStyle/>
+          <a:p>
+            <a:pPr marL="280035" indent="-280035">
+              <a:lnSpc>
+                <a:spcPct val="150000"/>
+              </a:lnSpc>
+              <a:spcAft>
+                <a:spcPts val="588"/>
+              </a:spcAft>
+              <a:buFont typeface="Arial,Sans-Serif" panose="020B0604020202020204" pitchFamily="34" charset="0"/>
+            </a:pPr>
+            <a:endParaRPr lang="en-US">
+              <a:ea typeface="+mn-lt"/>
+              <a:cs typeface="+mn-lt"/>
+            </a:endParaRPr>
+          </a:p>
+          <a:p>
+            <a:pPr marL="280035" indent="-280035">
+              <a:lnSpc>
+                <a:spcPct val="90000"/>
+              </a:lnSpc>
+              <a:spcAft>
+                <a:spcPts val="588"/>
+              </a:spcAft>
+              <a:buFont typeface="Arial,Sans-Serif" panose="020B0604020202020204" pitchFamily="34" charset="0"/>
+              <a:buChar char="•"/>
+            </a:pPr>
+            <a:endParaRPr lang="en-US">
+              <a:ea typeface="+mn-lt"/>
+              <a:cs typeface="+mn-lt"/>
+            </a:endParaRPr>
+          </a:p>
+          <a:p>
+            <a:pPr marL="335915" indent="-335915"/>
+            <a:endParaRPr lang="en-US">
+              <a:ea typeface="+mn-lt"/>
+              <a:cs typeface="+mn-lt"/>
+            </a:endParaRPr>
+          </a:p>
+        </p:txBody>
+      </p:sp>
+      <p:sp>
+        <p:nvSpPr>
+          <p:cNvPr id="4" name="TextBox 3">
+            <a:extLst>
+              <a:ext uri="{FF2B5EF4-FFF2-40B4-BE49-F238E27FC236}">
+                <a16:creationId xmlns:a16="http://schemas.microsoft.com/office/drawing/2014/main" id="{40C999F7-4F4C-403D-A55C-E359CFC56B8B}"/>
+              </a:ext>
+            </a:extLst>
+          </p:cNvPr>
+          <p:cNvSpPr txBox="1"/>
+          <p:nvPr/>
+        </p:nvSpPr>
+        <p:spPr>
+          <a:xfrm>
+            <a:off x="1055411" y="1469630"/>
+            <a:ext cx="10081178" cy="2388346"/>
+          </a:xfrm>
+          <a:prstGeom prst="rect">
+            <a:avLst/>
+          </a:prstGeom>
+          <a:noFill/>
+        </p:spPr>
+        <p:txBody>
+          <a:bodyPr rot="0" spcFirstLastPara="0" vertOverflow="overflow" horzOverflow="overflow" vert="horz" wrap="square" lIns="182880" tIns="146304" rIns="182880" bIns="146304" numCol="1" spcCol="0" rtlCol="0" fromWordArt="0" anchor="t" anchorCtr="0" forceAA="0" compatLnSpc="1">
+            <a:prstTxWarp prst="textNoShape">
+              <a:avLst/>
+            </a:prstTxWarp>
+            <a:spAutoFit/>
+          </a:bodyPr>
+          <a:lstStyle/>
+          <a:p>
+            <a:pPr marL="457200" indent="-457200">
+              <a:buFont typeface="Arial" panose="020B0604020202020204" pitchFamily="34" charset="0"/>
+              <a:buChar char="•"/>
+            </a:pPr>
+            <a:r>
+              <a:rPr lang="en-US" sz="2800" b="0" dirty="0">
+                <a:solidFill>
+                  <a:srgbClr val="000000"/>
+                </a:solidFill>
+                <a:effectLst/>
+              </a:rPr>
+              <a:t>X</a:t>
+            </a:r>
+          </a:p>
+          <a:p>
+            <a:pPr marL="457200" indent="-457200">
+              <a:buFont typeface="Arial" panose="020B0604020202020204" pitchFamily="34" charset="0"/>
+              <a:buChar char="•"/>
+            </a:pPr>
+            <a:r>
+              <a:rPr lang="en-US" sz="2800" b="0" dirty="0">
+                <a:solidFill>
+                  <a:srgbClr val="000000"/>
+                </a:solidFill>
+                <a:effectLst/>
+              </a:rPr>
+              <a:t>The TypeScript/Express/Cosmos DB Web Application - code walkthrough and demo</a:t>
+            </a:r>
+          </a:p>
+          <a:p>
+            <a:pPr marL="457200" indent="-457200">
+              <a:buFont typeface="Arial" panose="020B0604020202020204" pitchFamily="34" charset="0"/>
+              <a:buChar char="•"/>
+            </a:pPr>
+            <a:endParaRPr lang="en-US" sz="2800" b="0" dirty="0">
+              <a:solidFill>
+                <a:srgbClr val="000000"/>
+              </a:solidFill>
+              <a:effectLst/>
+            </a:endParaRPr>
+          </a:p>
+          <a:p>
+            <a:endParaRPr lang="en-US" sz="2400" dirty="0">
+              <a:cs typeface="Segoe UI"/>
+            </a:endParaRPr>
+          </a:p>
+        </p:txBody>
+      </p:sp>
+      <p:sp>
+        <p:nvSpPr>
+          <p:cNvPr id="9" name="Rectangle 8">
+            <a:extLst>
+              <a:ext uri="{FF2B5EF4-FFF2-40B4-BE49-F238E27FC236}">
+                <a16:creationId xmlns:a16="http://schemas.microsoft.com/office/drawing/2014/main" id="{E3743541-CC54-4122-901F-31E4C928C0B5}"/>
+              </a:ext>
+            </a:extLst>
+          </p:cNvPr>
+          <p:cNvSpPr/>
+          <p:nvPr/>
+        </p:nvSpPr>
+        <p:spPr bwMode="auto">
+          <a:xfrm>
+            <a:off x="5667829" y="968829"/>
+            <a:ext cx="914400" cy="152400"/>
+          </a:xfrm>
+          <a:prstGeom prst="rect">
+            <a:avLst/>
+          </a:prstGeom>
+          <a:solidFill>
+            <a:schemeClr val="bg1"/>
+          </a:solidFill>
+          <a:ln>
+            <a:noFill/>
+            <a:headEnd type="none" w="med" len="med"/>
+            <a:tailEnd type="none" w="med" len="med"/>
+          </a:ln>
+          <a:effectLst/>
+        </p:spPr>
+        <p:style>
+          <a:lnRef idx="1">
+            <a:schemeClr val="accent2"/>
+          </a:lnRef>
+          <a:fillRef idx="3">
+            <a:schemeClr val="accent2"/>
+          </a:fillRef>
+          <a:effectRef idx="2">
+            <a:schemeClr val="accent2"/>
+          </a:effectRef>
+          <a:fontRef idx="minor">
+            <a:schemeClr val="lt1"/>
+          </a:fontRef>
+        </p:style>
+        <p:txBody>
+          <a:bodyPr rot="0" spcFirstLastPara="0" vertOverflow="overflow" horzOverflow="overflow" vert="horz" wrap="square" lIns="182880" tIns="146304" rIns="182880" bIns="146304" numCol="1" spcCol="0" rtlCol="0" fromWordArt="0" anchor="t" anchorCtr="0" forceAA="0" compatLnSpc="1">
+            <a:prstTxWarp prst="textNoShape">
+              <a:avLst/>
+            </a:prstTxWarp>
+            <a:noAutofit/>
+          </a:bodyPr>
+          <a:lstStyle/>
+          <a:p>
+            <a:pPr algn="ctr" defTabSz="932472" fontAlgn="base">
+              <a:lnSpc>
+                <a:spcPct val="90000"/>
+              </a:lnSpc>
+              <a:spcBef>
+                <a:spcPct val="0"/>
+              </a:spcBef>
+              <a:spcAft>
+                <a:spcPct val="0"/>
+              </a:spcAft>
+            </a:pPr>
+            <a:endParaRPr lang="en-US" sz="2400" err="1">
+              <a:gradFill>
+                <a:gsLst>
+                  <a:gs pos="0">
+                    <a:srgbClr val="FFFFFF"/>
+                  </a:gs>
+                  <a:gs pos="100000">
+                    <a:srgbClr val="FFFFFF"/>
+                  </a:gs>
+                </a:gsLst>
+                <a:lin ang="5400000" scaled="0"/>
+              </a:gradFill>
+              <a:ea typeface="Segoe UI" pitchFamily="34" charset="0"/>
+              <a:cs typeface="Segoe UI" pitchFamily="34" charset="0"/>
+            </a:endParaRPr>
+          </a:p>
+        </p:txBody>
+      </p:sp>
+      <p:sp>
+        <p:nvSpPr>
+          <p:cNvPr id="25" name="Rectangle 24">
+            <a:extLst>
+              <a:ext uri="{FF2B5EF4-FFF2-40B4-BE49-F238E27FC236}">
+                <a16:creationId xmlns:a16="http://schemas.microsoft.com/office/drawing/2014/main" id="{34DBF81F-4274-4E2A-AAB7-489C7A6E6394}"/>
+              </a:ext>
+            </a:extLst>
+          </p:cNvPr>
+          <p:cNvSpPr/>
+          <p:nvPr/>
+        </p:nvSpPr>
+        <p:spPr bwMode="auto">
+          <a:xfrm>
+            <a:off x="11442970" y="1188395"/>
+            <a:ext cx="249676" cy="71336"/>
+          </a:xfrm>
+          <a:prstGeom prst="rect">
+            <a:avLst/>
+          </a:prstGeom>
+          <a:solidFill>
+            <a:schemeClr val="bg1"/>
+          </a:solidFill>
+          <a:ln>
+            <a:noFill/>
+            <a:headEnd type="none" w="med" len="med"/>
+            <a:tailEnd type="none" w="med" len="med"/>
+          </a:ln>
+          <a:effectLst/>
+        </p:spPr>
+        <p:style>
+          <a:lnRef idx="1">
+            <a:schemeClr val="accent2"/>
+          </a:lnRef>
+          <a:fillRef idx="3">
+            <a:schemeClr val="accent2"/>
+          </a:fillRef>
+          <a:effectRef idx="2">
+            <a:schemeClr val="accent2"/>
+          </a:effectRef>
+          <a:fontRef idx="minor">
+            <a:schemeClr val="lt1"/>
+          </a:fontRef>
+        </p:style>
+        <p:txBody>
+          <a:bodyPr rot="0" spcFirstLastPara="0" vertOverflow="overflow" horzOverflow="overflow" vert="horz" wrap="square" lIns="182880" tIns="146304" rIns="182880" bIns="146304" numCol="1" spcCol="0" rtlCol="0" fromWordArt="0" anchor="t" anchorCtr="0" forceAA="0" compatLnSpc="1">
+            <a:prstTxWarp prst="textNoShape">
+              <a:avLst/>
+            </a:prstTxWarp>
+            <a:noAutofit/>
+          </a:bodyPr>
+          <a:lstStyle/>
+          <a:p>
+            <a:pPr algn="ctr" defTabSz="932472" fontAlgn="base">
+              <a:lnSpc>
+                <a:spcPct val="90000"/>
+              </a:lnSpc>
+              <a:spcBef>
+                <a:spcPct val="0"/>
+              </a:spcBef>
+              <a:spcAft>
+                <a:spcPct val="0"/>
+              </a:spcAft>
+            </a:pPr>
+            <a:endParaRPr lang="en-US" sz="2400" err="1">
+              <a:gradFill>
+                <a:gsLst>
+                  <a:gs pos="0">
+                    <a:srgbClr val="FFFFFF"/>
+                  </a:gs>
+                  <a:gs pos="100000">
+                    <a:srgbClr val="FFFFFF"/>
+                  </a:gs>
+                </a:gsLst>
+                <a:lin ang="5400000" scaled="0"/>
+              </a:gradFill>
+              <a:ea typeface="Segoe UI" pitchFamily="34" charset="0"/>
+              <a:cs typeface="Segoe UI" pitchFamily="34" charset="0"/>
+            </a:endParaRPr>
+          </a:p>
+        </p:txBody>
+      </p:sp>
+      <p:sp>
+        <p:nvSpPr>
+          <p:cNvPr id="26" name="Rectangle 25">
+            <a:extLst>
+              <a:ext uri="{FF2B5EF4-FFF2-40B4-BE49-F238E27FC236}">
+                <a16:creationId xmlns:a16="http://schemas.microsoft.com/office/drawing/2014/main" id="{9B6E6037-C806-4A4B-A60D-ABC4892E98B9}"/>
+              </a:ext>
+            </a:extLst>
+          </p:cNvPr>
+          <p:cNvSpPr/>
+          <p:nvPr/>
+        </p:nvSpPr>
+        <p:spPr bwMode="auto">
+          <a:xfrm>
+            <a:off x="11370012" y="1139756"/>
+            <a:ext cx="249676" cy="71336"/>
+          </a:xfrm>
+          <a:prstGeom prst="rect">
+            <a:avLst/>
+          </a:prstGeom>
+          <a:solidFill>
+            <a:schemeClr val="bg1"/>
+          </a:solidFill>
+          <a:ln>
+            <a:noFill/>
+            <a:headEnd type="none" w="med" len="med"/>
+            <a:tailEnd type="none" w="med" len="med"/>
+          </a:ln>
+          <a:effectLst/>
+        </p:spPr>
+        <p:style>
+          <a:lnRef idx="1">
+            <a:schemeClr val="accent2"/>
+          </a:lnRef>
+          <a:fillRef idx="3">
+            <a:schemeClr val="accent2"/>
+          </a:fillRef>
+          <a:effectRef idx="2">
+            <a:schemeClr val="accent2"/>
+          </a:effectRef>
+          <a:fontRef idx="minor">
+            <a:schemeClr val="lt1"/>
+          </a:fontRef>
+        </p:style>
+        <p:txBody>
+          <a:bodyPr rot="0" spcFirstLastPara="0" vertOverflow="overflow" horzOverflow="overflow" vert="horz" wrap="square" lIns="182880" tIns="146304" rIns="182880" bIns="146304" numCol="1" spcCol="0" rtlCol="0" fromWordArt="0" anchor="t" anchorCtr="0" forceAA="0" compatLnSpc="1">
+            <a:prstTxWarp prst="textNoShape">
+              <a:avLst/>
+            </a:prstTxWarp>
+            <a:noAutofit/>
+          </a:bodyPr>
+          <a:lstStyle/>
+          <a:p>
+            <a:pPr algn="ctr" defTabSz="932472" fontAlgn="base">
+              <a:lnSpc>
+                <a:spcPct val="90000"/>
+              </a:lnSpc>
+              <a:spcBef>
+                <a:spcPct val="0"/>
+              </a:spcBef>
+              <a:spcAft>
+                <a:spcPct val="0"/>
+              </a:spcAft>
+            </a:pPr>
+            <a:endParaRPr lang="en-US" sz="2400" err="1">
+              <a:gradFill>
+                <a:gsLst>
+                  <a:gs pos="0">
+                    <a:srgbClr val="FFFFFF"/>
+                  </a:gs>
+                  <a:gs pos="100000">
+                    <a:srgbClr val="FFFFFF"/>
+                  </a:gs>
+                </a:gsLst>
+                <a:lin ang="5400000" scaled="0"/>
+              </a:gradFill>
+              <a:ea typeface="Segoe UI" pitchFamily="34" charset="0"/>
+              <a:cs typeface="Segoe UI" pitchFamily="34" charset="0"/>
+            </a:endParaRPr>
+          </a:p>
+        </p:txBody>
+      </p:sp>
+    </p:spTree>
+    <p:extLst>
+      <p:ext uri="{BB962C8B-B14F-4D97-AF65-F5344CB8AC3E}">
+        <p14:creationId xmlns:p14="http://schemas.microsoft.com/office/powerpoint/2010/main" val="2287162188"/>
+      </p:ext>
+    </p:extLst>
+  </p:cSld>
+  <p:clrMapOvr>
+    <a:masterClrMapping/>
+  </p:clrMapOvr>
+  <p:transition>
+    <p:fade/>
+  </p:transition>
+</p:sld>
+</file>
+
+<file path=ppt/slides/slide9.xml><?xml version="1.0" encoding="utf-8"?>
+<p:sld xmlns:a="http://schemas.openxmlformats.org/drawingml/2006/main" xmlns:r="http://schemas.openxmlformats.org/officeDocument/2006/relationships" xmlns:p="http://schemas.openxmlformats.org/presentationml/2006/main">
+  <p:cSld>
+    <p:spTree>
+      <p:nvGrpSpPr>
+        <p:cNvPr id="1" name=""/>
+        <p:cNvGrpSpPr/>
+        <p:nvPr/>
+      </p:nvGrpSpPr>
+      <p:grpSpPr>
+        <a:xfrm>
+          <a:off x="0" y="0"/>
+          <a:ext cx="0" cy="0"/>
+          <a:chOff x="0" y="0"/>
+          <a:chExt cx="0" cy="0"/>
+        </a:xfrm>
+      </p:grpSpPr>
+      <p:sp>
+        <p:nvSpPr>
+          <p:cNvPr id="2" name="Title 1">
+            <a:extLst>
+              <a:ext uri="{FF2B5EF4-FFF2-40B4-BE49-F238E27FC236}">
+                <a16:creationId xmlns:a16="http://schemas.microsoft.com/office/drawing/2014/main" id="{E5BBB390-B73E-4812-940C-A2213C93E2DC}"/>
+              </a:ext>
+            </a:extLst>
+          </p:cNvPr>
+          <p:cNvSpPr>
+            <a:spLocks noGrp="1"/>
+          </p:cNvSpPr>
+          <p:nvPr>
+            <p:ph type="title"/>
+          </p:nvPr>
+        </p:nvSpPr>
+        <p:spPr>
+          <a:xfrm>
+            <a:off x="455995" y="620428"/>
+            <a:ext cx="11306469" cy="397545"/>
+          </a:xfrm>
+        </p:spPr>
+        <p:txBody>
+          <a:bodyPr/>
+          <a:lstStyle/>
+          <a:p>
+            <a:r>
+              <a:rPr lang="en-US" dirty="0">
+                <a:solidFill>
+                  <a:schemeClr val="accent2">
+                    <a:lumMod val="60000"/>
+                    <a:lumOff val="40000"/>
+                  </a:schemeClr>
+                </a:solidFill>
+                <a:cs typeface="Segoe UI Semibold"/>
+              </a:rPr>
+              <a:t>The TypeScript/Express/Cosmos DB Web Application : Demo</a:t>
+            </a:r>
+            <a:endParaRPr lang="en-US" dirty="0">
+              <a:solidFill>
+                <a:schemeClr val="accent2">
+                  <a:lumMod val="60000"/>
+                  <a:lumOff val="40000"/>
+                </a:schemeClr>
+              </a:solidFill>
+            </a:endParaRPr>
+          </a:p>
+        </p:txBody>
+      </p:sp>
+      <p:sp>
+        <p:nvSpPr>
+          <p:cNvPr id="3" name="Text Placeholder 2">
+            <a:extLst>
+              <a:ext uri="{FF2B5EF4-FFF2-40B4-BE49-F238E27FC236}">
+                <a16:creationId xmlns:a16="http://schemas.microsoft.com/office/drawing/2014/main" id="{AC3E1E3F-8E9B-4AA3-AFD9-4D7278053F9A}"/>
+              </a:ext>
+            </a:extLst>
+          </p:cNvPr>
+          <p:cNvSpPr>
+            <a:spLocks noGrp="1"/>
+          </p:cNvSpPr>
+          <p:nvPr>
+            <p:ph type="body" sz="quarter" idx="10"/>
+          </p:nvPr>
+        </p:nvSpPr>
+        <p:spPr>
+          <a:xfrm>
+            <a:off x="455995" y="1922586"/>
+            <a:ext cx="9384447" cy="1200329"/>
+          </a:xfrm>
+        </p:spPr>
+        <p:txBody>
+          <a:bodyPr vert="horz" wrap="square" lIns="0" tIns="0" rIns="0" bIns="0" rtlCol="0" anchor="t">
+            <a:spAutoFit/>
+          </a:bodyPr>
+          <a:lstStyle/>
+          <a:p>
+            <a:pPr marL="280035" indent="-280035">
+              <a:lnSpc>
+                <a:spcPct val="150000"/>
+              </a:lnSpc>
+              <a:spcAft>
+                <a:spcPts val="588"/>
+              </a:spcAft>
+              <a:buFont typeface="Arial,Sans-Serif" panose="020B0604020202020204" pitchFamily="34" charset="0"/>
+            </a:pPr>
+            <a:endParaRPr lang="en-US">
+              <a:ea typeface="+mn-lt"/>
+              <a:cs typeface="+mn-lt"/>
+            </a:endParaRPr>
+          </a:p>
+          <a:p>
+            <a:pPr marL="280035" indent="-280035">
+              <a:lnSpc>
+                <a:spcPct val="90000"/>
+              </a:lnSpc>
+              <a:spcAft>
+                <a:spcPts val="588"/>
+              </a:spcAft>
+              <a:buFont typeface="Arial,Sans-Serif" panose="020B0604020202020204" pitchFamily="34" charset="0"/>
+              <a:buChar char="•"/>
+            </a:pPr>
+            <a:endParaRPr lang="en-US">
+              <a:ea typeface="+mn-lt"/>
+              <a:cs typeface="+mn-lt"/>
+            </a:endParaRPr>
+          </a:p>
+          <a:p>
+            <a:pPr marL="335915" indent="-335915"/>
+            <a:endParaRPr lang="en-US">
+              <a:ea typeface="+mn-lt"/>
+              <a:cs typeface="+mn-lt"/>
+            </a:endParaRPr>
+          </a:p>
+        </p:txBody>
+      </p:sp>
+      <p:sp>
+        <p:nvSpPr>
+          <p:cNvPr id="4" name="TextBox 3">
+            <a:extLst>
+              <a:ext uri="{FF2B5EF4-FFF2-40B4-BE49-F238E27FC236}">
+                <a16:creationId xmlns:a16="http://schemas.microsoft.com/office/drawing/2014/main" id="{40C999F7-4F4C-403D-A55C-E359CFC56B8B}"/>
+              </a:ext>
+            </a:extLst>
+          </p:cNvPr>
+          <p:cNvSpPr txBox="1"/>
+          <p:nvPr/>
+        </p:nvSpPr>
+        <p:spPr>
+          <a:xfrm>
+            <a:off x="1055411" y="1469630"/>
+            <a:ext cx="10081178" cy="2388346"/>
+          </a:xfrm>
+          <a:prstGeom prst="rect">
+            <a:avLst/>
+          </a:prstGeom>
+          <a:noFill/>
+        </p:spPr>
+        <p:txBody>
+          <a:bodyPr rot="0" spcFirstLastPara="0" vertOverflow="overflow" horzOverflow="overflow" vert="horz" wrap="square" lIns="182880" tIns="146304" rIns="182880" bIns="146304" numCol="1" spcCol="0" rtlCol="0" fromWordArt="0" anchor="t" anchorCtr="0" forceAA="0" compatLnSpc="1">
+            <a:prstTxWarp prst="textNoShape">
+              <a:avLst/>
+            </a:prstTxWarp>
+            <a:spAutoFit/>
+          </a:bodyPr>
+          <a:lstStyle/>
+          <a:p>
+            <a:pPr marL="457200" indent="-457200">
+              <a:buFont typeface="Arial" panose="020B0604020202020204" pitchFamily="34" charset="0"/>
+              <a:buChar char="•"/>
+            </a:pPr>
+            <a:r>
+              <a:rPr lang="en-US" sz="2800" b="0" dirty="0">
+                <a:solidFill>
+                  <a:srgbClr val="000000"/>
+                </a:solidFill>
+                <a:effectLst/>
+              </a:rPr>
+              <a:t>X</a:t>
+            </a:r>
+          </a:p>
+          <a:p>
+            <a:pPr marL="457200" indent="-457200">
+              <a:buFont typeface="Arial" panose="020B0604020202020204" pitchFamily="34" charset="0"/>
+              <a:buChar char="•"/>
+            </a:pPr>
+            <a:r>
+              <a:rPr lang="en-US" sz="2800" b="0" dirty="0">
+                <a:solidFill>
+                  <a:srgbClr val="000000"/>
+                </a:solidFill>
+                <a:effectLst/>
+              </a:rPr>
+              <a:t>The TypeScript/Express/Cosmos DB Web Application - code walkthrough and demo</a:t>
+            </a:r>
+          </a:p>
+          <a:p>
+            <a:pPr marL="457200" indent="-457200">
+              <a:buFont typeface="Arial" panose="020B0604020202020204" pitchFamily="34" charset="0"/>
+              <a:buChar char="•"/>
+            </a:pPr>
+            <a:endParaRPr lang="en-US" sz="2800" b="0" dirty="0">
+              <a:solidFill>
+                <a:srgbClr val="000000"/>
+              </a:solidFill>
+              <a:effectLst/>
+            </a:endParaRPr>
+          </a:p>
+          <a:p>
+            <a:endParaRPr lang="en-US" sz="2400" dirty="0">
+              <a:cs typeface="Segoe UI"/>
+            </a:endParaRPr>
+          </a:p>
+        </p:txBody>
+      </p:sp>
+      <p:sp>
+        <p:nvSpPr>
+          <p:cNvPr id="9" name="Rectangle 8">
+            <a:extLst>
+              <a:ext uri="{FF2B5EF4-FFF2-40B4-BE49-F238E27FC236}">
+                <a16:creationId xmlns:a16="http://schemas.microsoft.com/office/drawing/2014/main" id="{E3743541-CC54-4122-901F-31E4C928C0B5}"/>
+              </a:ext>
+            </a:extLst>
+          </p:cNvPr>
+          <p:cNvSpPr/>
+          <p:nvPr/>
+        </p:nvSpPr>
+        <p:spPr bwMode="auto">
+          <a:xfrm>
+            <a:off x="5667829" y="968829"/>
+            <a:ext cx="914400" cy="152400"/>
+          </a:xfrm>
+          <a:prstGeom prst="rect">
+            <a:avLst/>
+          </a:prstGeom>
+          <a:solidFill>
+            <a:schemeClr val="bg1"/>
+          </a:solidFill>
+          <a:ln>
+            <a:noFill/>
+            <a:headEnd type="none" w="med" len="med"/>
+            <a:tailEnd type="none" w="med" len="med"/>
+          </a:ln>
+          <a:effectLst/>
+        </p:spPr>
+        <p:style>
+          <a:lnRef idx="1">
+            <a:schemeClr val="accent2"/>
+          </a:lnRef>
+          <a:fillRef idx="3">
+            <a:schemeClr val="accent2"/>
+          </a:fillRef>
+          <a:effectRef idx="2">
+            <a:schemeClr val="accent2"/>
+          </a:effectRef>
+          <a:fontRef idx="minor">
+            <a:schemeClr val="lt1"/>
+          </a:fontRef>
+        </p:style>
+        <p:txBody>
+          <a:bodyPr rot="0" spcFirstLastPara="0" vertOverflow="overflow" horzOverflow="overflow" vert="horz" wrap="square" lIns="182880" tIns="146304" rIns="182880" bIns="146304" numCol="1" spcCol="0" rtlCol="0" fromWordArt="0" anchor="t" anchorCtr="0" forceAA="0" compatLnSpc="1">
+            <a:prstTxWarp prst="textNoShape">
+              <a:avLst/>
+            </a:prstTxWarp>
+            <a:noAutofit/>
+          </a:bodyPr>
+          <a:lstStyle/>
+          <a:p>
+            <a:pPr algn="ctr" defTabSz="932472" fontAlgn="base">
+              <a:lnSpc>
+                <a:spcPct val="90000"/>
+              </a:lnSpc>
+              <a:spcBef>
+                <a:spcPct val="0"/>
+              </a:spcBef>
+              <a:spcAft>
+                <a:spcPct val="0"/>
+              </a:spcAft>
+            </a:pPr>
+            <a:endParaRPr lang="en-US" sz="2400" err="1">
+              <a:gradFill>
+                <a:gsLst>
+                  <a:gs pos="0">
+                    <a:srgbClr val="FFFFFF"/>
+                  </a:gs>
+                  <a:gs pos="100000">
+                    <a:srgbClr val="FFFFFF"/>
+                  </a:gs>
+                </a:gsLst>
+                <a:lin ang="5400000" scaled="0"/>
+              </a:gradFill>
+              <a:ea typeface="Segoe UI" pitchFamily="34" charset="0"/>
+              <a:cs typeface="Segoe UI" pitchFamily="34" charset="0"/>
+            </a:endParaRPr>
+          </a:p>
+        </p:txBody>
+      </p:sp>
+      <p:sp>
+        <p:nvSpPr>
+          <p:cNvPr id="25" name="Rectangle 24">
+            <a:extLst>
+              <a:ext uri="{FF2B5EF4-FFF2-40B4-BE49-F238E27FC236}">
+                <a16:creationId xmlns:a16="http://schemas.microsoft.com/office/drawing/2014/main" id="{34DBF81F-4274-4E2A-AAB7-489C7A6E6394}"/>
+              </a:ext>
+            </a:extLst>
+          </p:cNvPr>
+          <p:cNvSpPr/>
+          <p:nvPr/>
+        </p:nvSpPr>
+        <p:spPr bwMode="auto">
+          <a:xfrm>
+            <a:off x="11442970" y="1188395"/>
+            <a:ext cx="249676" cy="71336"/>
+          </a:xfrm>
+          <a:prstGeom prst="rect">
+            <a:avLst/>
+          </a:prstGeom>
+          <a:solidFill>
+            <a:schemeClr val="bg1"/>
+          </a:solidFill>
+          <a:ln>
+            <a:noFill/>
+            <a:headEnd type="none" w="med" len="med"/>
+            <a:tailEnd type="none" w="med" len="med"/>
+          </a:ln>
+          <a:effectLst/>
+        </p:spPr>
+        <p:style>
+          <a:lnRef idx="1">
+            <a:schemeClr val="accent2"/>
+          </a:lnRef>
+          <a:fillRef idx="3">
+            <a:schemeClr val="accent2"/>
+          </a:fillRef>
+          <a:effectRef idx="2">
+            <a:schemeClr val="accent2"/>
+          </a:effectRef>
+          <a:fontRef idx="minor">
+            <a:schemeClr val="lt1"/>
+          </a:fontRef>
+        </p:style>
+        <p:txBody>
+          <a:bodyPr rot="0" spcFirstLastPara="0" vertOverflow="overflow" horzOverflow="overflow" vert="horz" wrap="square" lIns="182880" tIns="146304" rIns="182880" bIns="146304" numCol="1" spcCol="0" rtlCol="0" fromWordArt="0" anchor="t" anchorCtr="0" forceAA="0" compatLnSpc="1">
+            <a:prstTxWarp prst="textNoShape">
+              <a:avLst/>
+            </a:prstTxWarp>
+            <a:noAutofit/>
+          </a:bodyPr>
+          <a:lstStyle/>
+          <a:p>
+            <a:pPr algn="ctr" defTabSz="932472" fontAlgn="base">
+              <a:lnSpc>
+                <a:spcPct val="90000"/>
+              </a:lnSpc>
+              <a:spcBef>
+                <a:spcPct val="0"/>
+              </a:spcBef>
+              <a:spcAft>
+                <a:spcPct val="0"/>
+              </a:spcAft>
+            </a:pPr>
+            <a:endParaRPr lang="en-US" sz="2400" err="1">
+              <a:gradFill>
+                <a:gsLst>
+                  <a:gs pos="0">
+                    <a:srgbClr val="FFFFFF"/>
+                  </a:gs>
+                  <a:gs pos="100000">
+                    <a:srgbClr val="FFFFFF"/>
+                  </a:gs>
+                </a:gsLst>
+                <a:lin ang="5400000" scaled="0"/>
+              </a:gradFill>
+              <a:ea typeface="Segoe UI" pitchFamily="34" charset="0"/>
+              <a:cs typeface="Segoe UI" pitchFamily="34" charset="0"/>
+            </a:endParaRPr>
+          </a:p>
+        </p:txBody>
+      </p:sp>
+      <p:sp>
+        <p:nvSpPr>
+          <p:cNvPr id="26" name="Rectangle 25">
+            <a:extLst>
+              <a:ext uri="{FF2B5EF4-FFF2-40B4-BE49-F238E27FC236}">
+                <a16:creationId xmlns:a16="http://schemas.microsoft.com/office/drawing/2014/main" id="{9B6E6037-C806-4A4B-A60D-ABC4892E98B9}"/>
+              </a:ext>
+            </a:extLst>
+          </p:cNvPr>
+          <p:cNvSpPr/>
+          <p:nvPr/>
+        </p:nvSpPr>
+        <p:spPr bwMode="auto">
+          <a:xfrm>
+            <a:off x="11370012" y="1139756"/>
+            <a:ext cx="249676" cy="71336"/>
+          </a:xfrm>
+          <a:prstGeom prst="rect">
+            <a:avLst/>
+          </a:prstGeom>
+          <a:solidFill>
+            <a:schemeClr val="bg1"/>
+          </a:solidFill>
+          <a:ln>
+            <a:noFill/>
+            <a:headEnd type="none" w="med" len="med"/>
+            <a:tailEnd type="none" w="med" len="med"/>
+          </a:ln>
+          <a:effectLst/>
+        </p:spPr>
+        <p:style>
+          <a:lnRef idx="1">
+            <a:schemeClr val="accent2"/>
+          </a:lnRef>
+          <a:fillRef idx="3">
+            <a:schemeClr val="accent2"/>
+          </a:fillRef>
+          <a:effectRef idx="2">
+            <a:schemeClr val="accent2"/>
+          </a:effectRef>
+          <a:fontRef idx="minor">
+            <a:schemeClr val="lt1"/>
+          </a:fontRef>
+        </p:style>
+        <p:txBody>
+          <a:bodyPr rot="0" spcFirstLastPara="0" vertOverflow="overflow" horzOverflow="overflow" vert="horz" wrap="square" lIns="182880" tIns="146304" rIns="182880" bIns="146304" numCol="1" spcCol="0" rtlCol="0" fromWordArt="0" anchor="t" anchorCtr="0" forceAA="0" compatLnSpc="1">
+            <a:prstTxWarp prst="textNoShape">
+              <a:avLst/>
+            </a:prstTxWarp>
+            <a:noAutofit/>
+          </a:bodyPr>
+          <a:lstStyle/>
+          <a:p>
+            <a:pPr algn="ctr" defTabSz="932472" fontAlgn="base">
+              <a:lnSpc>
+                <a:spcPct val="90000"/>
+              </a:lnSpc>
+              <a:spcBef>
+                <a:spcPct val="0"/>
+              </a:spcBef>
+              <a:spcAft>
+                <a:spcPct val="0"/>
+              </a:spcAft>
+            </a:pPr>
+            <a:endParaRPr lang="en-US" sz="2400" err="1">
+              <a:gradFill>
+                <a:gsLst>
+                  <a:gs pos="0">
+                    <a:srgbClr val="FFFFFF"/>
+                  </a:gs>
+                  <a:gs pos="100000">
+                    <a:srgbClr val="FFFFFF"/>
+                  </a:gs>
+                </a:gsLst>
+                <a:lin ang="5400000" scaled="0"/>
+              </a:gradFill>
+              <a:ea typeface="Segoe UI" pitchFamily="34" charset="0"/>
+              <a:cs typeface="Segoe UI" pitchFamily="34" charset="0"/>
+            </a:endParaRPr>
+          </a:p>
+        </p:txBody>
+      </p:sp>
+    </p:spTree>
+    <p:extLst>
+      <p:ext uri="{BB962C8B-B14F-4D97-AF65-F5344CB8AC3E}">
+        <p14:creationId xmlns:p14="http://schemas.microsoft.com/office/powerpoint/2010/main" val="47329723"/>
       </p:ext>
     </p:extLst>
   </p:cSld>

</xml_diff>